<commit_message>
got rid of stray writing
</commit_message>
<xml_diff>
--- a/documents/Anguiano_Varshneya_LMU_Symposium_2015.pptx
+++ b/documents/Anguiano_Varshneya_LMU_Symposium_2015.pptx
@@ -1383,7 +1383,7 @@
               <a:buChar char="-"/>
             </a:pPr>
             <a:r>
-              <a:rPr lang="en-US" sz="1200" b="0" i="0" u="none" strike="noStrike" cap="none" baseline="0">
+              <a:rPr lang="en-US" sz="1200" b="0" i="0" u="none" strike="noStrike" cap="none" baseline="0" dirty="0">
                 <a:solidFill>
                   <a:schemeClr val="dk1"/>
                 </a:solidFill>
@@ -1408,7 +1408,7 @@
               <a:buChar char="-"/>
             </a:pPr>
             <a:r>
-              <a:rPr lang="en-US" sz="1200" b="0" i="0" u="none" strike="noStrike" cap="none" baseline="0">
+              <a:rPr lang="en-US" sz="1200" b="0" i="0" u="none" strike="noStrike" cap="none" baseline="0" dirty="0">
                 <a:solidFill>
                   <a:schemeClr val="dk1"/>
                 </a:solidFill>
@@ -1458,7 +1458,7 @@
               <a:buChar char="-"/>
             </a:pPr>
             <a:r>
-              <a:rPr lang="en-US" sz="1200" b="0" i="0" u="none" strike="noStrike" cap="none" baseline="0">
+              <a:rPr lang="en-US" sz="1200" b="0" i="0" u="none" strike="noStrike" cap="none" baseline="0" dirty="0">
                 <a:solidFill>
                   <a:schemeClr val="dk1"/>
                 </a:solidFill>
@@ -1483,7 +1483,7 @@
               <a:buChar char="-"/>
             </a:pPr>
             <a:r>
-              <a:rPr lang="en-US" sz="1200" b="0" i="0" u="none" strike="noStrike" cap="none" baseline="0">
+              <a:rPr lang="en-US" sz="1200" b="0" i="0" u="none" strike="noStrike" cap="none" baseline="0" dirty="0">
                 <a:solidFill>
                   <a:schemeClr val="dk1"/>
                 </a:solidFill>
@@ -1508,7 +1508,7 @@
               <a:buChar char="-"/>
             </a:pPr>
             <a:r>
-              <a:rPr lang="en-US" sz="1200" b="0" i="0" u="none" strike="noStrike" cap="none" baseline="0">
+              <a:rPr lang="en-US" sz="1200" b="0" i="0" u="none" strike="noStrike" cap="none" baseline="0" dirty="0">
                 <a:solidFill>
                   <a:schemeClr val="dk1"/>
                 </a:solidFill>
@@ -1533,7 +1533,7 @@
               <a:buChar char="-"/>
             </a:pPr>
             <a:r>
-              <a:rPr lang="en-US" sz="1200" b="0" i="0" u="none" strike="noStrike" cap="none" baseline="0">
+              <a:rPr lang="en-US" sz="1200" b="0" i="0" u="none" strike="noStrike" cap="none" baseline="0" dirty="0">
                 <a:solidFill>
                   <a:schemeClr val="dk1"/>
                 </a:solidFill>
@@ -1558,7 +1558,7 @@
               <a:buChar char="-"/>
             </a:pPr>
             <a:r>
-              <a:rPr lang="en-US" sz="1200" b="0" i="0" u="none" strike="noStrike" cap="none" baseline="0">
+              <a:rPr lang="en-US" sz="1200" b="0" i="0" u="none" strike="noStrike" cap="none" baseline="0" dirty="0">
                 <a:solidFill>
                   <a:schemeClr val="dk1"/>
                 </a:solidFill>
@@ -1583,7 +1583,7 @@
               <a:buChar char="-"/>
             </a:pPr>
             <a:r>
-              <a:rPr lang="en-US" sz="1200" b="0" i="0" u="none" strike="noStrike" cap="none" baseline="0">
+              <a:rPr lang="en-US" sz="1200" b="0" i="0" u="none" strike="noStrike" cap="none" baseline="0" dirty="0">
                 <a:solidFill>
                   <a:schemeClr val="dk1"/>
                 </a:solidFill>
@@ -1608,7 +1608,7 @@
               <a:buChar char="-"/>
             </a:pPr>
             <a:r>
-              <a:rPr lang="en-US" sz="1200" b="0" i="0" u="none" strike="noStrike" cap="none" baseline="0">
+              <a:rPr lang="en-US" sz="1200" b="0" i="0" u="none" strike="noStrike" cap="none" baseline="0" dirty="0">
                 <a:solidFill>
                   <a:schemeClr val="dk1"/>
                 </a:solidFill>
@@ -1633,7 +1633,7 @@
               <a:buChar char="-"/>
             </a:pPr>
             <a:r>
-              <a:rPr lang="en-US" sz="1200" b="0" i="0" u="none" strike="noStrike" cap="none" baseline="0">
+              <a:rPr lang="en-US" sz="1200" b="0" i="0" u="none" strike="noStrike" cap="none" baseline="0" dirty="0">
                 <a:solidFill>
                   <a:schemeClr val="dk1"/>
                 </a:solidFill>
@@ -1658,7 +1658,7 @@
               <a:buChar char="-"/>
             </a:pPr>
             <a:r>
-              <a:rPr lang="en-US" sz="1200" b="0" i="0" u="none" strike="noStrike" cap="none" baseline="0">
+              <a:rPr lang="en-US" sz="1200" b="0" i="0" u="none" strike="noStrike" cap="none" baseline="0" dirty="0">
                 <a:solidFill>
                   <a:schemeClr val="dk1"/>
                 </a:solidFill>
@@ -1683,7 +1683,7 @@
               <a:buChar char="-"/>
             </a:pPr>
             <a:r>
-              <a:rPr lang="en-US" sz="1200" b="0" i="0" u="none" strike="noStrike" cap="none" baseline="0">
+              <a:rPr lang="en-US" sz="1200" b="0" i="0" u="none" strike="noStrike" cap="none" baseline="0" dirty="0">
                 <a:solidFill>
                   <a:schemeClr val="dk1"/>
                 </a:solidFill>
@@ -1708,7 +1708,7 @@
               <a:buChar char="-"/>
             </a:pPr>
             <a:r>
-              <a:rPr lang="en-US" sz="1200" b="0" i="0" u="none" strike="noStrike" cap="none" baseline="0">
+              <a:rPr lang="en-US" sz="1200" b="0" i="0" u="none" strike="noStrike" cap="none" baseline="0" dirty="0">
                 <a:solidFill>
                   <a:schemeClr val="dk1"/>
                 </a:solidFill>
@@ -1733,7 +1733,7 @@
               <a:buChar char="-"/>
             </a:pPr>
             <a:r>
-              <a:rPr lang="en-US" sz="1200" b="0" i="0" u="none" strike="noStrike" cap="none" baseline="0">
+              <a:rPr lang="en-US" sz="1200" b="0" i="0" u="none" strike="noStrike" cap="none" baseline="0" dirty="0">
                 <a:solidFill>
                   <a:schemeClr val="dk1"/>
                 </a:solidFill>
@@ -1758,7 +1758,7 @@
               <a:buChar char="-"/>
             </a:pPr>
             <a:r>
-              <a:rPr lang="en-US" sz="1200" b="0" i="0" u="none" strike="noStrike" cap="none" baseline="0">
+              <a:rPr lang="en-US" sz="1200" b="0" i="0" u="none" strike="noStrike" cap="none" baseline="0" dirty="0">
                 <a:solidFill>
                   <a:schemeClr val="dk1"/>
                 </a:solidFill>
@@ -1783,7 +1783,7 @@
               <a:buChar char="-"/>
             </a:pPr>
             <a:r>
-              <a:rPr lang="en-US" sz="1200" b="0" i="0" u="none" strike="noStrike" cap="none" baseline="0">
+              <a:rPr lang="en-US" sz="1200" b="0" i="0" u="none" strike="noStrike" cap="none" baseline="0" dirty="0">
                 <a:solidFill>
                   <a:schemeClr val="dk1"/>
                 </a:solidFill>
@@ -1808,7 +1808,7 @@
               <a:buChar char="-"/>
             </a:pPr>
             <a:r>
-              <a:rPr lang="en-US" sz="1200" b="0" i="0" u="none" strike="noStrike" cap="none" baseline="0">
+              <a:rPr lang="en-US" sz="1200" b="0" i="0" u="none" strike="noStrike" cap="none" baseline="0" dirty="0" err="1">
                 <a:solidFill>
                   <a:schemeClr val="dk1"/>
                 </a:solidFill>
@@ -1817,7 +1817,19 @@
                 <a:cs typeface="Calibri"/>
                 <a:sym typeface="Calibri"/>
               </a:rPr>
-              <a:t>Mouseovers for edges screenshot</a:t>
+              <a:t>Mouseovers</a:t>
+            </a:r>
+            <a:r>
+              <a:rPr lang="en-US" sz="1200" b="0" i="0" u="none" strike="noStrike" cap="none" baseline="0" dirty="0">
+                <a:solidFill>
+                  <a:schemeClr val="dk1"/>
+                </a:solidFill>
+                <a:latin typeface="Calibri"/>
+                <a:ea typeface="Calibri"/>
+                <a:cs typeface="Calibri"/>
+                <a:sym typeface="Calibri"/>
+              </a:rPr>
+              <a:t> for edges screenshot</a:t>
             </a:r>
           </a:p>
         </p:txBody>
@@ -18218,7 +18230,7 @@
               <a:buChar char="•"/>
             </a:pPr>
             <a:r>
-              <a:rPr lang="en-US" sz="2200" b="0" i="0" u="none" strike="noStrike" cap="none" baseline="0">
+              <a:rPr lang="en-US" sz="2200" b="0" i="0" u="none" strike="noStrike" cap="none" baseline="0" dirty="0">
                 <a:solidFill>
                   <a:srgbClr val="000000"/>
                 </a:solidFill>
@@ -18250,7 +18262,7 @@
               <a:buChar char="•"/>
             </a:pPr>
             <a:r>
-              <a:rPr lang="en-US" sz="2200" b="0" i="0" u="none" strike="noStrike" cap="none" baseline="0">
+              <a:rPr lang="en-US" sz="2200" b="0" i="0" u="none" strike="noStrike" cap="none" baseline="0" dirty="0">
                 <a:solidFill>
                   <a:srgbClr val="000000"/>
                 </a:solidFill>
@@ -18260,8 +18272,34 @@
                 <a:sym typeface="Arial"/>
                 <a:rtl val="0"/>
               </a:rPr>
-              <a:t>Express Framework: http://expressjs.com/</a:t>
+              <a:t>Express Framework: http://</a:t>
             </a:r>
+            <a:r>
+              <a:rPr lang="en-US" sz="2200" b="0" i="0" u="none" strike="noStrike" cap="none" baseline="0" dirty="0" err="1">
+                <a:solidFill>
+                  <a:srgbClr val="000000"/>
+                </a:solidFill>
+                <a:latin typeface="Arial"/>
+                <a:ea typeface="Arial"/>
+                <a:cs typeface="Arial"/>
+                <a:sym typeface="Arial"/>
+                <a:rtl val="0"/>
+              </a:rPr>
+              <a:t>expressjs.com</a:t>
+            </a:r>
+            <a:r>
+              <a:rPr lang="en-US" sz="2200" b="0" i="0" u="none" strike="noStrike" cap="none" baseline="0" dirty="0">
+                <a:solidFill>
+                  <a:srgbClr val="000000"/>
+                </a:solidFill>
+                <a:latin typeface="Arial"/>
+                <a:ea typeface="Arial"/>
+                <a:cs typeface="Arial"/>
+                <a:sym typeface="Arial"/>
+                <a:rtl val="0"/>
+              </a:rPr>
+              <a:t>/</a:t>
+            </a:r>
           </a:p>
           <a:p>
             <a:pPr marL="342900" marR="0" lvl="0" indent="-342900" algn="l" rtl="0">
@@ -18282,7 +18320,7 @@
               <a:buChar char="•"/>
             </a:pPr>
             <a:r>
-              <a:rPr lang="en-US" sz="2200" b="0" i="0" u="none" strike="noStrike" cap="none" baseline="0">
+              <a:rPr lang="en-US" sz="2200" b="0" i="0" u="none" strike="noStrike" cap="none" baseline="0" dirty="0">
                 <a:solidFill>
                   <a:srgbClr val="000000"/>
                 </a:solidFill>
@@ -18314,7 +18352,7 @@
               <a:buChar char="•"/>
             </a:pPr>
             <a:r>
-              <a:rPr lang="en-US" sz="2200" b="0" i="0" u="none" strike="noStrike" cap="none" baseline="0">
+              <a:rPr lang="en-US" sz="2200" b="0" i="0" u="none" strike="noStrike" cap="none" baseline="0" dirty="0" err="1">
                 <a:solidFill>
                   <a:srgbClr val="000000"/>
                 </a:solidFill>
@@ -18324,29 +18362,10 @@
                 <a:sym typeface="Arial"/>
                 <a:rtl val="0"/>
               </a:rPr>
-              <a:t>GRNmap: http://kdahlquist.github.io/GRNmap/</a:t>
+              <a:t>GRNmap</a:t>
             </a:r>
-          </a:p>
-          <a:p>
-            <a:pPr marL="342900" marR="0" lvl="0" indent="-342900" algn="l" rtl="0">
-              <a:lnSpc>
-                <a:spcPct val="100000"/>
-              </a:lnSpc>
-              <a:spcBef>
-                <a:spcPts val="0"/>
-              </a:spcBef>
-              <a:spcAft>
-                <a:spcPts val="0"/>
-              </a:spcAft>
-              <a:buClr>
-                <a:srgbClr val="003700"/>
-              </a:buClr>
-              <a:buSzPct val="100000"/>
-              <a:buFont typeface="Arial"/>
-              <a:buChar char="•"/>
-            </a:pPr>
             <a:r>
-              <a:rPr lang="en-US" sz="2200" b="0" i="0" u="none" strike="noStrike" cap="none" baseline="0">
+              <a:rPr lang="en-US" sz="2200" b="0" i="0" u="none" strike="noStrike" cap="none" baseline="0" dirty="0">
                 <a:solidFill>
                   <a:srgbClr val="000000"/>
                 </a:solidFill>
@@ -18356,8 +18375,190 @@
                 <a:sym typeface="Arial"/>
                 <a:rtl val="0"/>
               </a:rPr>
-              <a:t>Node.js: http://nodejs.org/</a:t>
+              <a:t>: http://</a:t>
             </a:r>
+            <a:r>
+              <a:rPr lang="en-US" sz="2200" b="0" i="0" u="none" strike="noStrike" cap="none" baseline="0" dirty="0" err="1">
+                <a:solidFill>
+                  <a:srgbClr val="000000"/>
+                </a:solidFill>
+                <a:latin typeface="Arial"/>
+                <a:ea typeface="Arial"/>
+                <a:cs typeface="Arial"/>
+                <a:sym typeface="Arial"/>
+                <a:rtl val="0"/>
+              </a:rPr>
+              <a:t>kdahlquist.github.io</a:t>
+            </a:r>
+            <a:r>
+              <a:rPr lang="en-US" sz="2200" b="0" i="0" u="none" strike="noStrike" cap="none" baseline="0" dirty="0">
+                <a:solidFill>
+                  <a:srgbClr val="000000"/>
+                </a:solidFill>
+                <a:latin typeface="Arial"/>
+                <a:ea typeface="Arial"/>
+                <a:cs typeface="Arial"/>
+                <a:sym typeface="Arial"/>
+                <a:rtl val="0"/>
+              </a:rPr>
+              <a:t>/</a:t>
+            </a:r>
+            <a:r>
+              <a:rPr lang="en-US" sz="2200" b="0" i="0" u="none" strike="noStrike" cap="none" baseline="0" dirty="0" err="1">
+                <a:solidFill>
+                  <a:srgbClr val="000000"/>
+                </a:solidFill>
+                <a:latin typeface="Arial"/>
+                <a:ea typeface="Arial"/>
+                <a:cs typeface="Arial"/>
+                <a:sym typeface="Arial"/>
+                <a:rtl val="0"/>
+              </a:rPr>
+              <a:t>GRNmap</a:t>
+            </a:r>
+            <a:r>
+              <a:rPr lang="en-US" sz="2200" b="0" i="0" u="none" strike="noStrike" cap="none" baseline="0" dirty="0">
+                <a:solidFill>
+                  <a:srgbClr val="000000"/>
+                </a:solidFill>
+                <a:latin typeface="Arial"/>
+                <a:ea typeface="Arial"/>
+                <a:cs typeface="Arial"/>
+                <a:sym typeface="Arial"/>
+                <a:rtl val="0"/>
+              </a:rPr>
+              <a:t>/</a:t>
+            </a:r>
+          </a:p>
+          <a:p>
+            <a:pPr marL="342900" marR="0" lvl="0" indent="-342900" algn="l" rtl="0">
+              <a:lnSpc>
+                <a:spcPct val="100000"/>
+              </a:lnSpc>
+              <a:spcBef>
+                <a:spcPts val="0"/>
+              </a:spcBef>
+              <a:spcAft>
+                <a:spcPts val="0"/>
+              </a:spcAft>
+              <a:buClr>
+                <a:srgbClr val="003700"/>
+              </a:buClr>
+              <a:buSzPct val="100000"/>
+              <a:buFont typeface="Arial"/>
+              <a:buChar char="•"/>
+            </a:pPr>
+            <a:r>
+              <a:rPr lang="en-US" sz="2200" b="0" i="0" u="none" strike="noStrike" cap="none" baseline="0" dirty="0" err="1">
+                <a:solidFill>
+                  <a:srgbClr val="000000"/>
+                </a:solidFill>
+                <a:latin typeface="Arial"/>
+                <a:ea typeface="Arial"/>
+                <a:cs typeface="Arial"/>
+                <a:sym typeface="Arial"/>
+                <a:rtl val="0"/>
+              </a:rPr>
+              <a:t>Node.js</a:t>
+            </a:r>
+            <a:r>
+              <a:rPr lang="en-US" sz="2200" b="0" i="0" u="none" strike="noStrike" cap="none" baseline="0" dirty="0">
+                <a:solidFill>
+                  <a:srgbClr val="000000"/>
+                </a:solidFill>
+                <a:latin typeface="Arial"/>
+                <a:ea typeface="Arial"/>
+                <a:cs typeface="Arial"/>
+                <a:sym typeface="Arial"/>
+                <a:rtl val="0"/>
+              </a:rPr>
+              <a:t>: </a:t>
+            </a:r>
+            <a:r>
+              <a:rPr lang="en-US" sz="2200" b="0" i="0" u="none" strike="noStrike" cap="none" baseline="0" dirty="0">
+                <a:solidFill>
+                  <a:srgbClr val="000000"/>
+                </a:solidFill>
+                <a:latin typeface="Arial"/>
+                <a:ea typeface="Arial"/>
+                <a:cs typeface="Arial"/>
+                <a:sym typeface="Arial"/>
+                <a:hlinkClick r:id="rId7"/>
+                <a:rtl val="0"/>
+              </a:rPr>
+              <a:t>http://nodejs.org</a:t>
+            </a:r>
+            <a:r>
+              <a:rPr lang="en-US" sz="2200" b="0" i="0" u="none" strike="noStrike" cap="none" baseline="0" dirty="0" smtClean="0">
+                <a:solidFill>
+                  <a:srgbClr val="000000"/>
+                </a:solidFill>
+                <a:latin typeface="Arial"/>
+                <a:ea typeface="Arial"/>
+                <a:cs typeface="Arial"/>
+                <a:sym typeface="Arial"/>
+                <a:hlinkClick r:id="rId7"/>
+                <a:rtl val="0"/>
+              </a:rPr>
+              <a:t>/</a:t>
+            </a:r>
+            <a:endParaRPr lang="en-US" sz="2200" b="0" i="0" u="none" strike="noStrike" cap="none" baseline="0" dirty="0" smtClean="0">
+              <a:solidFill>
+                <a:srgbClr val="000000"/>
+              </a:solidFill>
+              <a:latin typeface="Arial"/>
+              <a:ea typeface="Arial"/>
+              <a:cs typeface="Arial"/>
+              <a:sym typeface="Arial"/>
+              <a:rtl val="0"/>
+            </a:endParaRPr>
+          </a:p>
+          <a:p>
+            <a:pPr marL="342900" lvl="0" indent="-342900">
+              <a:buClr>
+                <a:srgbClr val="003700"/>
+              </a:buClr>
+              <a:buSzPct val="100000"/>
+              <a:buFont typeface="Arial"/>
+              <a:buChar char="•"/>
+            </a:pPr>
+            <a:r>
+              <a:rPr lang="en-US" sz="2200" dirty="0"/>
+              <a:t>Mocha: </a:t>
+            </a:r>
+            <a:r>
+              <a:rPr lang="en-US" sz="2200" dirty="0">
+                <a:hlinkClick r:id="rId8"/>
+              </a:rPr>
+              <a:t>http://mochajs.org</a:t>
+            </a:r>
+            <a:r>
+              <a:rPr lang="en-US" sz="2200" dirty="0" smtClean="0">
+                <a:hlinkClick r:id="rId8"/>
+              </a:rPr>
+              <a:t>/</a:t>
+            </a:r>
+            <a:endParaRPr lang="en-US" sz="2200" dirty="0" smtClean="0"/>
+          </a:p>
+          <a:p>
+            <a:pPr marL="342900" lvl="0" indent="-342900">
+              <a:buClr>
+                <a:srgbClr val="003700"/>
+              </a:buClr>
+              <a:buSzPct val="100000"/>
+              <a:buFont typeface="Arial"/>
+              <a:buChar char="•"/>
+            </a:pPr>
+            <a:endParaRPr lang="en-US" sz="2200" b="0" i="0" u="none" strike="noStrike" cap="none" baseline="0" dirty="0">
+              <a:solidFill>
+                <a:srgbClr val="000000"/>
+              </a:solidFill>
+              <a:latin typeface="Arial"/>
+              <a:ea typeface="Arial"/>
+              <a:cs typeface="Arial"/>
+              <a:sym typeface="Arial"/>
+              <a:rtl val="0"/>
+            </a:endParaRPr>
           </a:p>
           <a:p>
             <a:pPr marL="0" marR="0" lvl="0" indent="0" algn="l" rtl="0">
@@ -18376,7 +18577,7 @@
               <a:buFont typeface="Arial"/>
               <a:buNone/>
             </a:pPr>
-            <a:endParaRPr sz="2200" b="0" i="0" u="none" strike="noStrike" cap="none" baseline="0">
+            <a:endParaRPr sz="2200" b="0" i="0" u="none" strike="noStrike" cap="none" baseline="0" dirty="0">
               <a:solidFill>
                 <a:srgbClr val="003700"/>
               </a:solidFill>
@@ -18396,7 +18597,7 @@
           <p:nvPr/>
         </p:nvPicPr>
         <p:blipFill rotWithShape="1">
-          <a:blip r:embed="rId7">
+          <a:blip r:embed="rId9">
             <a:alphaModFix/>
           </a:blip>
           <a:srcRect/>
@@ -18460,46 +18661,16 @@
               <a:buFont typeface="Arial"/>
               <a:buNone/>
             </a:pPr>
-            <a:r>
-              <a:rPr lang="en-US" sz="900" b="0" i="0" u="none" strike="noStrike" cap="none" baseline="0">
-                <a:solidFill>
-                  <a:srgbClr val="222222"/>
-                </a:solidFill>
-                <a:latin typeface="Arial"/>
-                <a:ea typeface="Arial"/>
-                <a:cs typeface="Arial"/>
-                <a:sym typeface="Arial"/>
-                <a:rtl val="0"/>
-              </a:rPr>
-              <a:t>MATLAB model available at </a:t>
-            </a:r>
-            <a:r>
-              <a:rPr lang="en-US" sz="900" b="0" i="0" u="sng" strike="noStrike" cap="none" baseline="0">
-                <a:solidFill>
-                  <a:schemeClr val="hlink"/>
-                </a:solidFill>
-                <a:latin typeface="Arial"/>
-                <a:ea typeface="Arial"/>
-                <a:cs typeface="Arial"/>
-                <a:sym typeface="Arial"/>
-                <a:hlinkClick r:id="rId8"/>
-                <a:rtl val="0"/>
-              </a:rPr>
-              <a:t>http://kdahlquist.github.io/GRNmap/</a:t>
-            </a:r>
-            <a:r>
-              <a:rPr lang="en-US" sz="2800" b="0" i="0" u="none" strike="noStrike" cap="none" baseline="0">
-                <a:solidFill>
-                  <a:schemeClr val="dk1"/>
-                </a:solidFill>
-                <a:latin typeface="Arial"/>
-                <a:ea typeface="Arial"/>
-                <a:cs typeface="Arial"/>
-                <a:sym typeface="Arial"/>
-                <a:rtl val="0"/>
-              </a:rPr>
-              <a:t> </a:t>
-            </a:r>
+            <a:endParaRPr lang="en-US" sz="2800" b="0" i="0" u="none" strike="noStrike" cap="none" baseline="0" dirty="0">
+              <a:solidFill>
+                <a:schemeClr val="dk1"/>
+              </a:solidFill>
+              <a:latin typeface="Arial"/>
+              <a:ea typeface="Arial"/>
+              <a:cs typeface="Arial"/>
+              <a:sym typeface="Arial"/>
+              <a:rtl val="0"/>
+            </a:endParaRPr>
           </a:p>
         </p:txBody>
       </p:sp>
@@ -18510,7 +18681,7 @@
           <p:nvPr/>
         </p:nvPicPr>
         <p:blipFill rotWithShape="1">
-          <a:blip r:embed="rId9">
+          <a:blip r:embed="rId10">
             <a:alphaModFix/>
           </a:blip>
           <a:srcRect l="8866" t="1807" r="7142" b="3158"/>
@@ -18537,7 +18708,7 @@
           <p:nvPr/>
         </p:nvPicPr>
         <p:blipFill rotWithShape="1">
-          <a:blip r:embed="rId10">
+          <a:blip r:embed="rId11">
             <a:alphaModFix/>
           </a:blip>
           <a:srcRect/>
@@ -18564,7 +18735,7 @@
           <p:nvPr/>
         </p:nvPicPr>
         <p:blipFill rotWithShape="1">
-          <a:blip r:embed="rId11">
+          <a:blip r:embed="rId12">
             <a:alphaModFix/>
           </a:blip>
           <a:srcRect r="10182"/>
@@ -18591,7 +18762,7 @@
           <p:nvPr/>
         </p:nvPicPr>
         <p:blipFill rotWithShape="1">
-          <a:blip r:embed="rId12">
+          <a:blip r:embed="rId13">
             <a:alphaModFix/>
           </a:blip>
           <a:srcRect l="27345" t="34020" b="29849"/>
@@ -19601,7 +19772,7 @@
           <p:nvPr/>
         </p:nvPicPr>
         <p:blipFill rotWithShape="1">
-          <a:blip r:embed="rId13">
+          <a:blip r:embed="rId14">
             <a:alphaModFix/>
           </a:blip>
           <a:srcRect t="35156"/>
@@ -19628,7 +19799,7 @@
           <p:nvPr/>
         </p:nvPicPr>
         <p:blipFill rotWithShape="1">
-          <a:blip r:embed="rId14">
+          <a:blip r:embed="rId15">
             <a:alphaModFix/>
           </a:blip>
           <a:srcRect/>
@@ -20122,7 +20293,7 @@
           <p:nvPr/>
         </p:nvPicPr>
         <p:blipFill rotWithShape="1">
-          <a:blip r:embed="rId15">
+          <a:blip r:embed="rId16">
             <a:alphaModFix/>
           </a:blip>
           <a:srcRect/>
@@ -20149,7 +20320,7 @@
           <p:nvPr/>
         </p:nvPicPr>
         <p:blipFill rotWithShape="1">
-          <a:blip r:embed="rId16">
+          <a:blip r:embed="rId17">
             <a:alphaModFix/>
           </a:blip>
           <a:srcRect/>
@@ -20718,7 +20889,7 @@
           <p:nvPr/>
         </p:nvPicPr>
         <p:blipFill rotWithShape="1">
-          <a:blip r:embed="rId17">
+          <a:blip r:embed="rId18">
             <a:alphaModFix/>
           </a:blip>
           <a:srcRect/>
@@ -20745,7 +20916,7 @@
           <p:nvPr/>
         </p:nvPicPr>
         <p:blipFill rotWithShape="1">
-          <a:blip r:embed="rId18">
+          <a:blip r:embed="rId19">
             <a:alphaModFix/>
           </a:blip>
           <a:srcRect/>
@@ -20809,7 +20980,7 @@
           <p:nvPr/>
         </p:nvPicPr>
         <p:blipFill>
-          <a:blip r:embed="rId19">
+          <a:blip r:embed="rId20">
             <a:alphaModFix/>
           </a:blip>
           <a:stretch>
@@ -20837,7 +21008,7 @@
           <p:nvPr/>
         </p:nvPicPr>
         <p:blipFill rotWithShape="1">
-          <a:blip r:embed="rId20">
+          <a:blip r:embed="rId21">
             <a:alphaModFix/>
           </a:blip>
           <a:srcRect b="48214"/>
@@ -20864,7 +21035,7 @@
           <p:nvPr/>
         </p:nvPicPr>
         <p:blipFill>
-          <a:blip r:embed="rId21">
+          <a:blip r:embed="rId22">
             <a:alphaModFix/>
           </a:blip>
           <a:stretch>
@@ -20894,7 +21065,7 @@
           <p:nvPr/>
         </p:nvPicPr>
         <p:blipFill>
-          <a:blip r:embed="rId22"/>
+          <a:blip r:embed="rId23"/>
           <a:stretch>
             <a:fillRect/>
           </a:stretch>

</xml_diff>

<commit_message>
Made some edits to the poster.
</commit_message>
<xml_diff>
--- a/documents/Anguiano_Varshneya_LMU_Symposium_2015.pptx
+++ b/documents/Anguiano_Varshneya_LMU_Symposium_2015.pptx
@@ -23925,177 +23925,11 @@
                 <a:sym typeface="Arial"/>
                 <a:rtl val="0"/>
               </a:rPr>
-              <a:t> is a differential equations model of the changes in gene expression over time for a gene regulatory network.</a:t>
-            </a:r>
-          </a:p>
-          <a:p>
-            <a:pPr marL="342900" marR="0" lvl="0" indent="-342900" algn="l" rtl="0">
-              <a:lnSpc>
-                <a:spcPct val="100000"/>
-              </a:lnSpc>
-              <a:spcBef>
-                <a:spcPts val="0"/>
-              </a:spcBef>
-              <a:spcAft>
-                <a:spcPts val="0"/>
-              </a:spcAft>
-              <a:buClr>
-                <a:schemeClr val="dk1"/>
-              </a:buClr>
-              <a:buSzPct val="100000"/>
-              <a:buFont typeface="Arial"/>
-              <a:buChar char="•"/>
-            </a:pPr>
-            <a:r>
-              <a:rPr lang="en-US" sz="2200" b="0" i="0" u="none" strike="noStrike" cap="none" baseline="0" dirty="0">
-                <a:solidFill>
-                  <a:schemeClr val="dk1"/>
-                </a:solidFill>
-                <a:latin typeface="Arial"/>
-                <a:ea typeface="Arial"/>
-                <a:cs typeface="Arial"/>
-                <a:sym typeface="Arial"/>
-                <a:rtl val="0"/>
-              </a:rPr>
-              <a:t>Each gene (node) in the network has an equation.</a:t>
-            </a:r>
-          </a:p>
-          <a:p>
-            <a:pPr marL="342900" marR="0" lvl="0" indent="-342900" algn="l" rtl="0">
-              <a:lnSpc>
-                <a:spcPct val="100000"/>
-              </a:lnSpc>
-              <a:spcBef>
-                <a:spcPts val="0"/>
-              </a:spcBef>
-              <a:spcAft>
-                <a:spcPts val="0"/>
-              </a:spcAft>
-              <a:buClr>
-                <a:schemeClr val="dk1"/>
-              </a:buClr>
-              <a:buSzPct val="100000"/>
-              <a:buFont typeface="Arial"/>
-              <a:buChar char="•"/>
-            </a:pPr>
-            <a:r>
-              <a:rPr lang="en-US" sz="2200" b="0" i="0" u="none" strike="noStrike" cap="none" baseline="0" dirty="0">
-                <a:solidFill>
-                  <a:schemeClr val="dk1"/>
-                </a:solidFill>
-                <a:latin typeface="Arial"/>
-                <a:ea typeface="Arial"/>
-                <a:cs typeface="Arial"/>
-                <a:sym typeface="Arial"/>
-                <a:rtl val="0"/>
-              </a:rPr>
-              <a:t>The parameters in the model are estimated from laboratory data.</a:t>
-            </a:r>
-          </a:p>
-          <a:p>
-            <a:pPr marL="342900" marR="0" lvl="0" indent="-342900" algn="l" rtl="0">
-              <a:lnSpc>
-                <a:spcPct val="100000"/>
-              </a:lnSpc>
-              <a:spcBef>
-                <a:spcPts val="0"/>
-              </a:spcBef>
-              <a:spcAft>
-                <a:spcPts val="0"/>
-              </a:spcAft>
-              <a:buClr>
-                <a:schemeClr val="dk1"/>
-              </a:buClr>
-              <a:buSzPct val="100000"/>
-              <a:buFont typeface="Arial"/>
-              <a:buChar char="•"/>
-            </a:pPr>
-            <a:r>
-              <a:rPr lang="en-US" sz="2200" b="0" i="0" u="none" strike="noStrike" cap="none" baseline="0" dirty="0">
-                <a:solidFill>
-                  <a:schemeClr val="dk1"/>
-                </a:solidFill>
-                <a:latin typeface="Arial"/>
-                <a:ea typeface="Arial"/>
-                <a:cs typeface="Arial"/>
-                <a:sym typeface="Arial"/>
-                <a:rtl val="0"/>
-              </a:rPr>
-              <a:t>The weight parameter, </a:t>
-            </a:r>
-            <a:r>
-              <a:rPr lang="en-US" sz="2200" b="0" i="1" u="none" strike="noStrike" cap="none" baseline="0" dirty="0">
-                <a:solidFill>
-                  <a:schemeClr val="dk1"/>
-                </a:solidFill>
-                <a:latin typeface="Arial"/>
-                <a:ea typeface="Arial"/>
-                <a:cs typeface="Arial"/>
-                <a:sym typeface="Arial"/>
-                <a:rtl val="0"/>
-              </a:rPr>
-              <a:t>w</a:t>
-            </a:r>
-            <a:r>
-              <a:rPr lang="en-US" sz="2200" b="0" i="0" u="none" strike="noStrike" cap="none" baseline="0" dirty="0">
-                <a:solidFill>
-                  <a:schemeClr val="dk1"/>
-                </a:solidFill>
-                <a:latin typeface="Arial"/>
-                <a:ea typeface="Arial"/>
-                <a:cs typeface="Arial"/>
-                <a:sym typeface="Arial"/>
-                <a:rtl val="0"/>
-              </a:rPr>
-              <a:t>, gives the direction (activation or repression) and magnitude of </a:t>
-            </a:r>
-            <a:r>
-              <a:rPr lang="en-US" sz="2200" b="0" i="0" u="none" strike="noStrike" cap="none" baseline="0" dirty="0" smtClean="0">
-                <a:solidFill>
-                  <a:schemeClr val="dk1"/>
-                </a:solidFill>
-                <a:latin typeface="Arial"/>
-                <a:ea typeface="Arial"/>
-                <a:cs typeface="Arial"/>
-                <a:sym typeface="Arial"/>
-                <a:rtl val="0"/>
-              </a:rPr>
-              <a:t>the regulatory </a:t>
-            </a:r>
-            <a:r>
-              <a:rPr lang="en-US" sz="2200" b="0" i="0" u="none" strike="noStrike" cap="none" baseline="0" dirty="0">
-                <a:solidFill>
-                  <a:schemeClr val="dk1"/>
-                </a:solidFill>
-                <a:latin typeface="Arial"/>
-                <a:ea typeface="Arial"/>
-                <a:cs typeface="Arial"/>
-                <a:sym typeface="Arial"/>
-                <a:rtl val="0"/>
-              </a:rPr>
-              <a:t>relationship.</a:t>
-            </a:r>
-          </a:p>
-          <a:p>
-            <a:pPr marL="0" marR="0" lvl="0" indent="0" algn="l" rtl="0">
-              <a:lnSpc>
-                <a:spcPct val="100000"/>
-              </a:lnSpc>
-              <a:spcBef>
-                <a:spcPts val="0"/>
-              </a:spcBef>
-              <a:spcAft>
-                <a:spcPts val="0"/>
-              </a:spcAft>
-              <a:buClr>
-                <a:srgbClr val="000000"/>
-              </a:buClr>
-              <a:buFont typeface="Arial"/>
-              <a:buNone/>
-            </a:pPr>
-            <a:endParaRPr sz="2200" b="0" i="0" u="none" strike="noStrike" cap="none" baseline="0" dirty="0">
+              <a:t> is a differential equations model of the </a:t>
+            </a:r>
+            <a:endParaRPr lang="en-US" sz="2200" b="0" i="0" u="none" strike="noStrike" cap="none" baseline="0" dirty="0" smtClean="0">
               <a:solidFill>
-                <a:schemeClr val="dk1"/>
+                <a:srgbClr val="000000"/>
               </a:solidFill>
               <a:latin typeface="Arial"/>
               <a:ea typeface="Arial"/>
@@ -24105,27 +23939,37 @@
             </a:endParaRPr>
           </a:p>
           <a:p>
-            <a:pPr marL="0" marR="0" lvl="0" indent="0" algn="l" rtl="0">
-              <a:lnSpc>
-                <a:spcPct val="100000"/>
-              </a:lnSpc>
-              <a:spcBef>
-                <a:spcPts val="0"/>
-              </a:spcBef>
-              <a:spcAft>
-                <a:spcPts val="0"/>
-              </a:spcAft>
-              <a:buClr>
-                <a:schemeClr val="dk1"/>
-              </a:buClr>
-              <a:buSzPct val="25000"/>
-              <a:buFont typeface="Arial"/>
-              <a:buNone/>
-            </a:pPr>
-            <a:r>
-              <a:rPr lang="en-US" sz="2200" b="1" i="0" u="none" strike="noStrike" cap="none" baseline="0" dirty="0" err="1">
-                <a:solidFill>
-                  <a:schemeClr val="dk1"/>
+            <a:pPr marR="0" lvl="0" algn="l" rtl="0">
+              <a:lnSpc>
+                <a:spcPct val="100000"/>
+              </a:lnSpc>
+              <a:spcBef>
+                <a:spcPts val="0"/>
+              </a:spcBef>
+              <a:spcAft>
+                <a:spcPts val="0"/>
+              </a:spcAft>
+              <a:buClr>
+                <a:schemeClr val="dk1"/>
+              </a:buClr>
+              <a:buSzPct val="100000"/>
+            </a:pPr>
+            <a:r>
+              <a:rPr lang="en-US" sz="2200" dirty="0"/>
+              <a:t> </a:t>
+            </a:r>
+            <a:r>
+              <a:rPr lang="en-US" sz="2200" dirty="0" smtClean="0"/>
+              <a:t> </a:t>
+            </a:r>
+            <a:r>
+              <a:rPr lang="en-US" sz="800" dirty="0" smtClean="0"/>
+              <a:t>       </a:t>
+            </a:r>
+            <a:r>
+              <a:rPr lang="en-US" sz="2200" b="0" i="0" u="none" strike="noStrike" cap="none" baseline="0" dirty="0" smtClean="0">
+                <a:solidFill>
+                  <a:srgbClr val="000000"/>
                 </a:solidFill>
                 <a:latin typeface="Arial"/>
                 <a:ea typeface="Arial"/>
@@ -24133,12 +23977,12 @@
                 <a:sym typeface="Arial"/>
                 <a:rtl val="0"/>
               </a:rPr>
-              <a:t>GRNmap</a:t>
-            </a:r>
-            <a:r>
-              <a:rPr lang="en-US" sz="2200" b="1" i="0" u="none" strike="noStrike" cap="none" baseline="0" dirty="0">
-                <a:solidFill>
-                  <a:schemeClr val="dk1"/>
+              <a:t>changes </a:t>
+            </a:r>
+            <a:r>
+              <a:rPr lang="en-US" sz="2200" b="0" i="0" u="none" strike="noStrike" cap="none" baseline="0" dirty="0">
+                <a:solidFill>
+                  <a:srgbClr val="000000"/>
                 </a:solidFill>
                 <a:latin typeface="Arial"/>
                 <a:ea typeface="Arial"/>
@@ -24146,7 +23990,7 @@
                 <a:sym typeface="Arial"/>
                 <a:rtl val="0"/>
               </a:rPr>
-              <a:t> produces an Excel spreadsheet with an adjacency matrix representing the network</a:t>
+              <a:t>in gene expression over time for a gene regulatory network.</a:t>
             </a:r>
           </a:p>
           <a:p>
@@ -24178,7 +24022,7 @@
                 <a:sym typeface="Arial"/>
                 <a:rtl val="0"/>
               </a:rPr>
-              <a:t>0 represents no relationship.</a:t>
+              <a:t>Each gene (node) in the network has an equation.</a:t>
             </a:r>
           </a:p>
           <a:p>
@@ -24210,10 +24054,29 @@
                 <a:sym typeface="Arial"/>
                 <a:rtl val="0"/>
               </a:rPr>
-              <a:t>A positive </a:t>
-            </a:r>
-            <a:r>
-              <a:rPr lang="en-US" sz="2200" b="0" i="0" u="none" strike="noStrike" cap="none" baseline="0" dirty="0" smtClean="0">
+              <a:t>The parameters in the model are estimated from laboratory data.</a:t>
+            </a:r>
+          </a:p>
+          <a:p>
+            <a:pPr marL="342900" marR="0" lvl="0" indent="-342900" algn="l" rtl="0">
+              <a:lnSpc>
+                <a:spcPct val="100000"/>
+              </a:lnSpc>
+              <a:spcBef>
+                <a:spcPts val="0"/>
+              </a:spcBef>
+              <a:spcAft>
+                <a:spcPts val="0"/>
+              </a:spcAft>
+              <a:buClr>
+                <a:schemeClr val="dk1"/>
+              </a:buClr>
+              <a:buSzPct val="100000"/>
+              <a:buFont typeface="Arial"/>
+              <a:buChar char="•"/>
+            </a:pPr>
+            <a:r>
+              <a:rPr lang="en-US" sz="2200" b="0" i="0" u="none" strike="noStrike" cap="none" baseline="0" dirty="0">
                 <a:solidFill>
                   <a:schemeClr val="dk1"/>
                 </a:solidFill>
@@ -24223,10 +24086,10 @@
                 <a:sym typeface="Arial"/>
                 <a:rtl val="0"/>
               </a:rPr>
-              <a:t>weight</a:t>
-            </a:r>
-            <a:r>
-              <a:rPr lang="en-US" sz="2200" b="0" i="0" u="none" strike="noStrike" cap="none" dirty="0" smtClean="0">
+              <a:t>The weight parameter, </a:t>
+            </a:r>
+            <a:r>
+              <a:rPr lang="en-US" sz="2200" b="0" i="1" u="none" strike="noStrike" cap="none" baseline="0" dirty="0">
                 <a:solidFill>
                   <a:schemeClr val="dk1"/>
                 </a:solidFill>
@@ -24236,10 +24099,10 @@
                 <a:sym typeface="Arial"/>
                 <a:rtl val="0"/>
               </a:rPr>
-              <a:t> value</a:t>
-            </a:r>
-            <a:r>
-              <a:rPr lang="en-US" sz="2200" b="0" i="0" u="none" strike="noStrike" cap="none" baseline="0" dirty="0" smtClean="0">
+              <a:t>w</a:t>
+            </a:r>
+            <a:r>
+              <a:rPr lang="en-US" sz="2200" b="0" i="0" u="none" strike="noStrike" cap="none" baseline="0" dirty="0">
                 <a:solidFill>
                   <a:schemeClr val="dk1"/>
                 </a:solidFill>
@@ -24249,10 +24112,10 @@
                 <a:sym typeface="Arial"/>
                 <a:rtl val="0"/>
               </a:rPr>
-              <a:t> </a:t>
-            </a:r>
-            <a:r>
-              <a:rPr lang="en-US" sz="2200" b="0" i="0" u="none" strike="noStrike" cap="none" baseline="0" dirty="0">
+              <a:t>, gives the direction (activation or repression) and magnitude of </a:t>
+            </a:r>
+            <a:r>
+              <a:rPr lang="en-US" sz="2200" b="0" i="0" u="none" strike="noStrike" cap="none" baseline="0" dirty="0" smtClean="0">
                 <a:solidFill>
                   <a:schemeClr val="dk1"/>
                 </a:solidFill>
@@ -24262,27 +24125,8 @@
                 <a:sym typeface="Arial"/>
                 <a:rtl val="0"/>
               </a:rPr>
-              <a:t>indicates activation.</a:t>
-            </a:r>
-          </a:p>
-          <a:p>
-            <a:pPr marL="342900" marR="0" lvl="0" indent="-342900" algn="l" rtl="0">
-              <a:lnSpc>
-                <a:spcPct val="100000"/>
-              </a:lnSpc>
-              <a:spcBef>
-                <a:spcPts val="0"/>
-              </a:spcBef>
-              <a:spcAft>
-                <a:spcPts val="0"/>
-              </a:spcAft>
-              <a:buClr>
-                <a:schemeClr val="dk1"/>
-              </a:buClr>
-              <a:buSzPct val="100000"/>
-              <a:buFont typeface="Arial"/>
-              <a:buChar char="•"/>
-            </a:pPr>
+              <a:t>the regulatory </a:t>
+            </a:r>
             <a:r>
               <a:rPr lang="en-US" sz="2200" b="0" i="0" u="none" strike="noStrike" cap="none" baseline="0" dirty="0">
                 <a:solidFill>
@@ -24294,10 +24138,57 @@
                 <a:sym typeface="Arial"/>
                 <a:rtl val="0"/>
               </a:rPr>
-              <a:t>A negative </a:t>
-            </a:r>
-            <a:r>
-              <a:rPr lang="en-US" sz="2200" b="0" i="0" u="none" strike="noStrike" cap="none" baseline="0" dirty="0" smtClean="0">
+              <a:t>relationship.</a:t>
+            </a:r>
+          </a:p>
+          <a:p>
+            <a:pPr marL="0" marR="0" lvl="0" indent="0" algn="l" rtl="0">
+              <a:lnSpc>
+                <a:spcPct val="100000"/>
+              </a:lnSpc>
+              <a:spcBef>
+                <a:spcPts val="0"/>
+              </a:spcBef>
+              <a:spcAft>
+                <a:spcPts val="0"/>
+              </a:spcAft>
+              <a:buClr>
+                <a:srgbClr val="000000"/>
+              </a:buClr>
+              <a:buFont typeface="Arial"/>
+              <a:buNone/>
+            </a:pPr>
+            <a:endParaRPr sz="2200" b="0" i="0" u="none" strike="noStrike" cap="none" baseline="0" dirty="0" smtClean="0">
+              <a:solidFill>
+                <a:schemeClr val="dk1"/>
+              </a:solidFill>
+              <a:latin typeface="Arial"/>
+              <a:ea typeface="Arial"/>
+              <a:cs typeface="Arial"/>
+              <a:sym typeface="Arial"/>
+              <a:rtl val="0"/>
+            </a:endParaRPr>
+          </a:p>
+          <a:p>
+            <a:pPr marL="0" marR="0" lvl="0" indent="0" algn="l" rtl="0">
+              <a:lnSpc>
+                <a:spcPct val="100000"/>
+              </a:lnSpc>
+              <a:spcBef>
+                <a:spcPts val="0"/>
+              </a:spcBef>
+              <a:spcAft>
+                <a:spcPts val="0"/>
+              </a:spcAft>
+              <a:buClr>
+                <a:schemeClr val="dk1"/>
+              </a:buClr>
+              <a:buSzPct val="25000"/>
+              <a:buFont typeface="Arial"/>
+              <a:buNone/>
+            </a:pPr>
+            <a:r>
+              <a:rPr lang="en-US" sz="2200" b="1" i="0" u="none" strike="noStrike" cap="none" baseline="0" dirty="0" err="1" smtClean="0">
                 <a:solidFill>
                   <a:schemeClr val="dk1"/>
                 </a:solidFill>
@@ -24307,10 +24198,10 @@
                 <a:sym typeface="Arial"/>
                 <a:rtl val="0"/>
               </a:rPr>
-              <a:t>weight value </a:t>
-            </a:r>
-            <a:r>
-              <a:rPr lang="en-US" sz="2200" b="0" i="0" u="none" strike="noStrike" cap="none" baseline="0" dirty="0">
+              <a:t>GRNmap</a:t>
+            </a:r>
+            <a:r>
+              <a:rPr lang="en-US" sz="2200" b="1" i="0" u="none" strike="noStrike" cap="none" baseline="0" dirty="0" smtClean="0">
                 <a:solidFill>
                   <a:schemeClr val="dk1"/>
                 </a:solidFill>
@@ -24320,29 +24211,10 @@
                 <a:sym typeface="Arial"/>
                 <a:rtl val="0"/>
               </a:rPr>
-              <a:t>indicates repression.</a:t>
-            </a:r>
-          </a:p>
-          <a:p>
-            <a:pPr marL="342900" marR="0" lvl="0" indent="-342900" algn="l" rtl="0">
-              <a:lnSpc>
-                <a:spcPct val="100000"/>
-              </a:lnSpc>
-              <a:spcBef>
-                <a:spcPts val="0"/>
-              </a:spcBef>
-              <a:spcAft>
-                <a:spcPts val="0"/>
-              </a:spcAft>
-              <a:buClr>
-                <a:schemeClr val="dk1"/>
-              </a:buClr>
-              <a:buSzPct val="100000"/>
-              <a:buFont typeface="Arial"/>
-              <a:buChar char="•"/>
-            </a:pPr>
-            <a:r>
-              <a:rPr lang="en-US" sz="2200" b="0" i="0" u="none" strike="noStrike" cap="none" baseline="0" dirty="0">
+              <a:t> </a:t>
+            </a:r>
+            <a:r>
+              <a:rPr lang="en-US" sz="2200" b="1" i="0" u="none" strike="noStrike" cap="none" baseline="0" dirty="0">
                 <a:solidFill>
                   <a:schemeClr val="dk1"/>
                 </a:solidFill>
@@ -24352,7 +24224,7 @@
                 <a:sym typeface="Arial"/>
                 <a:rtl val="0"/>
               </a:rPr>
-              <a:t>The magnitude of the weight defines the strength of the relationship.</a:t>
+              <a:t>produces an Excel spreadsheet with an adjacency matrix representing the network</a:t>
             </a:r>
           </a:p>
           <a:p>
@@ -24384,10 +24256,29 @@
                 <a:sym typeface="Arial"/>
                 <a:rtl val="0"/>
               </a:rPr>
-              <a:t>However, </a:t>
-            </a:r>
-            <a:r>
-              <a:rPr lang="en-US" sz="2200" b="0" i="0" u="none" strike="noStrike" cap="none" baseline="0" dirty="0" err="1">
+              <a:t>0 represents no relationship.</a:t>
+            </a:r>
+          </a:p>
+          <a:p>
+            <a:pPr marL="342900" marR="0" lvl="0" indent="-342900" algn="l" rtl="0">
+              <a:lnSpc>
+                <a:spcPct val="100000"/>
+              </a:lnSpc>
+              <a:spcBef>
+                <a:spcPts val="0"/>
+              </a:spcBef>
+              <a:spcAft>
+                <a:spcPts val="0"/>
+              </a:spcAft>
+              <a:buClr>
+                <a:schemeClr val="dk1"/>
+              </a:buClr>
+              <a:buSzPct val="100000"/>
+              <a:buFont typeface="Arial"/>
+              <a:buChar char="•"/>
+            </a:pPr>
+            <a:r>
+              <a:rPr lang="en-US" sz="2200" b="0" i="0" u="none" strike="noStrike" cap="none" baseline="0" dirty="0">
                 <a:solidFill>
                   <a:schemeClr val="dk1"/>
                 </a:solidFill>
@@ -24397,10 +24288,10 @@
                 <a:sym typeface="Arial"/>
                 <a:rtl val="0"/>
               </a:rPr>
-              <a:t>GRNmap</a:t>
-            </a:r>
-            <a:r>
-              <a:rPr lang="en-US" sz="2200" b="0" i="0" u="none" strike="noStrike" cap="none" baseline="0" dirty="0">
+              <a:t>A positive </a:t>
+            </a:r>
+            <a:r>
+              <a:rPr lang="en-US" sz="2200" b="0" i="0" u="none" strike="noStrike" cap="none" baseline="0" dirty="0" smtClean="0">
                 <a:solidFill>
                   <a:schemeClr val="dk1"/>
                 </a:solidFill>
@@ -24410,10 +24301,10 @@
                 <a:sym typeface="Arial"/>
                 <a:rtl val="0"/>
               </a:rPr>
-              <a:t> does not generate </a:t>
-            </a:r>
-            <a:r>
-              <a:rPr lang="en-US" sz="2200" b="0" i="0" u="none" strike="noStrike" cap="none" baseline="0" dirty="0" smtClean="0">
+              <a:t>weight</a:t>
+            </a:r>
+            <a:r>
+              <a:rPr lang="en-US" sz="2200" b="0" i="0" u="none" strike="noStrike" cap="none" dirty="0" smtClean="0">
                 <a:solidFill>
                   <a:schemeClr val="dk1"/>
                 </a:solidFill>
@@ -24423,10 +24314,10 @@
                 <a:sym typeface="Arial"/>
                 <a:rtl val="0"/>
               </a:rPr>
-              <a:t>a </a:t>
-            </a:r>
-            <a:r>
-              <a:rPr lang="en-US" sz="2200" b="0" i="0" u="none" strike="noStrike" cap="none" baseline="0" dirty="0">
+              <a:t> value</a:t>
+            </a:r>
+            <a:r>
+              <a:rPr lang="en-US" sz="2200" b="0" i="0" u="none" strike="noStrike" cap="none" baseline="0" dirty="0" smtClean="0">
                 <a:solidFill>
                   <a:schemeClr val="dk1"/>
                 </a:solidFill>
@@ -24436,7 +24327,168 @@
                 <a:sym typeface="Arial"/>
                 <a:rtl val="0"/>
               </a:rPr>
-              <a:t>visual representation of the GRN.</a:t>
+              <a:t> </a:t>
+            </a:r>
+            <a:r>
+              <a:rPr lang="en-US" sz="2200" b="0" i="0" u="none" strike="noStrike" cap="none" baseline="0" dirty="0">
+                <a:solidFill>
+                  <a:schemeClr val="dk1"/>
+                </a:solidFill>
+                <a:latin typeface="Arial"/>
+                <a:ea typeface="Arial"/>
+                <a:cs typeface="Arial"/>
+                <a:sym typeface="Arial"/>
+                <a:rtl val="0"/>
+              </a:rPr>
+              <a:t>indicates activation.</a:t>
+            </a:r>
+          </a:p>
+          <a:p>
+            <a:pPr marL="342900" marR="0" lvl="0" indent="-342900" algn="l" rtl="0">
+              <a:lnSpc>
+                <a:spcPct val="100000"/>
+              </a:lnSpc>
+              <a:spcBef>
+                <a:spcPts val="0"/>
+              </a:spcBef>
+              <a:spcAft>
+                <a:spcPts val="0"/>
+              </a:spcAft>
+              <a:buClr>
+                <a:schemeClr val="dk1"/>
+              </a:buClr>
+              <a:buSzPct val="100000"/>
+              <a:buFont typeface="Arial"/>
+              <a:buChar char="•"/>
+            </a:pPr>
+            <a:r>
+              <a:rPr lang="en-US" sz="2200" b="0" i="0" u="none" strike="noStrike" cap="none" baseline="0" dirty="0">
+                <a:solidFill>
+                  <a:schemeClr val="dk1"/>
+                </a:solidFill>
+                <a:latin typeface="Arial"/>
+                <a:ea typeface="Arial"/>
+                <a:cs typeface="Arial"/>
+                <a:sym typeface="Arial"/>
+                <a:rtl val="0"/>
+              </a:rPr>
+              <a:t>A negative </a:t>
+            </a:r>
+            <a:r>
+              <a:rPr lang="en-US" sz="2200" b="0" i="0" u="none" strike="noStrike" cap="none" baseline="0" dirty="0" smtClean="0">
+                <a:solidFill>
+                  <a:schemeClr val="dk1"/>
+                </a:solidFill>
+                <a:latin typeface="Arial"/>
+                <a:ea typeface="Arial"/>
+                <a:cs typeface="Arial"/>
+                <a:sym typeface="Arial"/>
+                <a:rtl val="0"/>
+              </a:rPr>
+              <a:t>weight value </a:t>
+            </a:r>
+            <a:r>
+              <a:rPr lang="en-US" sz="2200" b="0" i="0" u="none" strike="noStrike" cap="none" baseline="0" dirty="0">
+                <a:solidFill>
+                  <a:schemeClr val="dk1"/>
+                </a:solidFill>
+                <a:latin typeface="Arial"/>
+                <a:ea typeface="Arial"/>
+                <a:cs typeface="Arial"/>
+                <a:sym typeface="Arial"/>
+                <a:rtl val="0"/>
+              </a:rPr>
+              <a:t>indicates repression.</a:t>
+            </a:r>
+          </a:p>
+          <a:p>
+            <a:pPr marL="342900" marR="0" lvl="0" indent="-342900" algn="l" rtl="0">
+              <a:lnSpc>
+                <a:spcPct val="100000"/>
+              </a:lnSpc>
+              <a:spcBef>
+                <a:spcPts val="0"/>
+              </a:spcBef>
+              <a:spcAft>
+                <a:spcPts val="0"/>
+              </a:spcAft>
+              <a:buClr>
+                <a:schemeClr val="dk1"/>
+              </a:buClr>
+              <a:buSzPct val="100000"/>
+              <a:buFont typeface="Arial"/>
+              <a:buChar char="•"/>
+            </a:pPr>
+            <a:r>
+              <a:rPr lang="en-US" sz="2200" b="0" i="0" u="none" strike="noStrike" cap="none" baseline="0" dirty="0" smtClean="0">
+                <a:solidFill>
+                  <a:schemeClr val="dk1"/>
+                </a:solidFill>
+                <a:latin typeface="Arial"/>
+                <a:ea typeface="Arial"/>
+                <a:cs typeface="Arial"/>
+                <a:sym typeface="Arial"/>
+                <a:rtl val="0"/>
+              </a:rPr>
+              <a:t>The magnitude of the weight defines the strength of the relationship.</a:t>
+            </a:r>
+          </a:p>
+          <a:p>
+            <a:pPr marL="342900" marR="0" lvl="0" indent="-342900" algn="l" rtl="0">
+              <a:lnSpc>
+                <a:spcPct val="100000"/>
+              </a:lnSpc>
+              <a:spcBef>
+                <a:spcPts val="0"/>
+              </a:spcBef>
+              <a:spcAft>
+                <a:spcPts val="0"/>
+              </a:spcAft>
+              <a:buClr>
+                <a:schemeClr val="dk1"/>
+              </a:buClr>
+              <a:buSzPct val="100000"/>
+              <a:buFont typeface="Arial"/>
+              <a:buChar char="•"/>
+            </a:pPr>
+            <a:r>
+              <a:rPr lang="en-US" sz="2200" b="0" i="0" u="none" strike="noStrike" cap="none" baseline="0" dirty="0" smtClean="0">
+                <a:solidFill>
+                  <a:schemeClr val="dk1"/>
+                </a:solidFill>
+                <a:latin typeface="Arial"/>
+                <a:ea typeface="Arial"/>
+                <a:cs typeface="Arial"/>
+                <a:sym typeface="Arial"/>
+                <a:rtl val="0"/>
+              </a:rPr>
+              <a:t>However, </a:t>
+            </a:r>
+            <a:r>
+              <a:rPr lang="en-US" sz="2200" b="0" i="0" u="none" strike="noStrike" cap="none" baseline="0" dirty="0" err="1" smtClean="0">
+                <a:solidFill>
+                  <a:schemeClr val="dk1"/>
+                </a:solidFill>
+                <a:latin typeface="Arial"/>
+                <a:ea typeface="Arial"/>
+                <a:cs typeface="Arial"/>
+                <a:sym typeface="Arial"/>
+                <a:rtl val="0"/>
+              </a:rPr>
+              <a:t>GRNmap</a:t>
+            </a:r>
+            <a:r>
+              <a:rPr lang="en-US" sz="2200" b="0" i="0" u="none" strike="noStrike" cap="none" baseline="0" dirty="0" smtClean="0">
+                <a:solidFill>
+                  <a:schemeClr val="dk1"/>
+                </a:solidFill>
+                <a:latin typeface="Arial"/>
+                <a:ea typeface="Arial"/>
+                <a:cs typeface="Arial"/>
+                <a:sym typeface="Arial"/>
+                <a:rtl val="0"/>
+              </a:rPr>
+              <a:t> does not generate a visual representation of the GRN.</a:t>
             </a:r>
           </a:p>
           <a:p>
@@ -24679,21 +24731,18 @@
                 <a:sym typeface="Arial"/>
                 <a:rtl val="0"/>
               </a:rPr>
-              <a:t> Spreadsheet </a:t>
-            </a:r>
-            <a:r>
-              <a:rPr lang="en-US" sz="3600" b="0" i="0" u="none" strike="noStrike" cap="none" baseline="0" dirty="0">
-                <a:solidFill>
-                  <a:srgbClr val="017C00"/>
-                </a:solidFill>
-                <a:latin typeface="Arial"/>
-                <a:ea typeface="Arial"/>
-                <a:cs typeface="Arial"/>
-                <a:sym typeface="Arial"/>
-                <a:rtl val="0"/>
-              </a:rPr>
-              <a:t>Requirements</a:t>
-            </a:r>
+              <a:t> Spreadsheet Requirements</a:t>
+            </a:r>
+            <a:endParaRPr lang="en-US" sz="3600" b="0" i="0" u="none" strike="noStrike" cap="none" baseline="0" dirty="0">
+              <a:solidFill>
+                <a:srgbClr val="017C00"/>
+              </a:solidFill>
+              <a:latin typeface="Arial"/>
+              <a:ea typeface="Arial"/>
+              <a:cs typeface="Arial"/>
+              <a:sym typeface="Arial"/>
+              <a:rtl val="0"/>
+            </a:endParaRPr>
           </a:p>
         </p:txBody>
       </p:sp>
@@ -24742,7 +24791,7 @@
               <a:buNone/>
             </a:pPr>
             <a:r>
-              <a:rPr lang="en-US" sz="2200" b="1" i="0" u="none" strike="noStrike" cap="none" baseline="0" dirty="0" err="1">
+              <a:rPr lang="en-US" sz="2200" b="1" i="0" u="none" strike="noStrike" cap="none" baseline="0" dirty="0" err="1" smtClean="0">
                 <a:solidFill>
                   <a:schemeClr val="dk1"/>
                 </a:solidFill>
@@ -24755,7 +24804,7 @@
               <a:t>GRNsight</a:t>
             </a:r>
             <a:r>
-              <a:rPr lang="en-US" sz="2200" b="1" i="0" u="none" strike="noStrike" cap="none" baseline="0" dirty="0">
+              <a:rPr lang="en-US" sz="2200" b="1" i="0" u="none" strike="noStrike" cap="none" baseline="0" dirty="0" smtClean="0">
                 <a:solidFill>
                   <a:schemeClr val="dk1"/>
                 </a:solidFill>
@@ -24765,10 +24814,10 @@
                 <a:sym typeface="Arial"/>
                 <a:rtl val="0"/>
               </a:rPr>
-              <a:t> Accepts </a:t>
-            </a:r>
-            <a:r>
-              <a:rPr lang="en-US" sz="2200" b="1" i="0" u="none" strike="noStrike" cap="none" baseline="0" dirty="0" smtClean="0">
+              <a:t> Accepts .</a:t>
+            </a:r>
+            <a:r>
+              <a:rPr lang="en-US" sz="2200" b="1" i="0" u="none" strike="noStrike" cap="none" baseline="0" dirty="0" err="1" smtClean="0">
                 <a:solidFill>
                   <a:schemeClr val="dk1"/>
                 </a:solidFill>
@@ -24778,10 +24827,10 @@
                 <a:sym typeface="Arial"/>
                 <a:rtl val="0"/>
               </a:rPr>
-              <a:t>.</a:t>
-            </a:r>
-            <a:r>
-              <a:rPr lang="en-US" sz="2200" b="1" i="0" u="none" strike="noStrike" cap="none" baseline="0" dirty="0" err="1" smtClean="0">
+              <a:t>xlsx</a:t>
+            </a:r>
+            <a:r>
+              <a:rPr lang="en-US" sz="2200" b="1" i="0" u="none" strike="noStrike" cap="none" baseline="0" dirty="0" smtClean="0">
                 <a:solidFill>
                   <a:schemeClr val="dk1"/>
                 </a:solidFill>
@@ -24791,10 +24840,29 @@
                 <a:sym typeface="Arial"/>
                 <a:rtl val="0"/>
               </a:rPr>
-              <a:t>xlsx</a:t>
-            </a:r>
-            <a:r>
-              <a:rPr lang="en-US" sz="2200" b="1" i="0" u="none" strike="noStrike" cap="none" baseline="0" dirty="0" smtClean="0">
+              <a:t> Files in the Proper Format</a:t>
+            </a:r>
+          </a:p>
+          <a:p>
+            <a:pPr marL="342900" marR="0" lvl="0" indent="-342900" algn="l" rtl="0">
+              <a:lnSpc>
+                <a:spcPct val="100000"/>
+              </a:lnSpc>
+              <a:spcBef>
+                <a:spcPts val="0"/>
+              </a:spcBef>
+              <a:spcAft>
+                <a:spcPts val="0"/>
+              </a:spcAft>
+              <a:buClr>
+                <a:schemeClr val="dk1"/>
+              </a:buClr>
+              <a:buSzPct val="100000"/>
+              <a:buFont typeface="Arial"/>
+              <a:buChar char="•"/>
+            </a:pPr>
+            <a:r>
+              <a:rPr lang="en-US" sz="2200" b="0" i="0" u="none" strike="noStrike" cap="none" baseline="0" dirty="0" smtClean="0">
                 <a:solidFill>
                   <a:schemeClr val="dk1"/>
                 </a:solidFill>
@@ -24804,10 +24872,10 @@
                 <a:sym typeface="Arial"/>
                 <a:rtl val="0"/>
               </a:rPr>
-              <a:t> </a:t>
-            </a:r>
-            <a:r>
-              <a:rPr lang="en-US" sz="2200" b="1" i="0" u="none" strike="noStrike" cap="none" baseline="0" dirty="0">
+              <a:t>Spreadsheets </a:t>
+            </a:r>
+            <a:r>
+              <a:rPr lang="en-US" sz="2200" b="0" i="0" u="none" strike="noStrike" cap="none" baseline="0" dirty="0">
                 <a:solidFill>
                   <a:schemeClr val="dk1"/>
                 </a:solidFill>
@@ -24817,39 +24885,7 @@
                 <a:sym typeface="Arial"/>
                 <a:rtl val="0"/>
               </a:rPr>
-              <a:t>Files in the Proper Format</a:t>
-            </a:r>
-          </a:p>
-          <a:p>
-            <a:pPr marL="342900" marR="0" lvl="0" indent="-342900" algn="l" rtl="0">
-              <a:lnSpc>
-                <a:spcPct val="100000"/>
-              </a:lnSpc>
-              <a:spcBef>
-                <a:spcPts val="0"/>
-              </a:spcBef>
-              <a:spcAft>
-                <a:spcPts val="0"/>
-              </a:spcAft>
-              <a:buClr>
-                <a:schemeClr val="dk1"/>
-              </a:buClr>
-              <a:buSzPct val="100000"/>
-              <a:buFont typeface="Arial"/>
-              <a:buChar char="•"/>
-            </a:pPr>
-            <a:r>
-              <a:rPr lang="en-US" sz="2200" b="0" i="0" u="none" strike="noStrike" cap="none" baseline="0" dirty="0">
-                <a:solidFill>
-                  <a:schemeClr val="dk1"/>
-                </a:solidFill>
-                <a:latin typeface="Arial"/>
-                <a:ea typeface="Arial"/>
-                <a:cs typeface="Arial"/>
-                <a:sym typeface="Arial"/>
-                <a:rtl val="0"/>
-              </a:rPr>
-              <a:t>Spreadsheets need a “network” or “</a:t>
+              <a:t>need a “network” or “</a:t>
             </a:r>
             <a:r>
               <a:rPr lang="en-US" sz="2200" b="0" i="0" u="none" strike="noStrike" cap="none" baseline="0" dirty="0" err="1">
@@ -27342,7 +27378,7 @@
         <p:spPr>
           <a:xfrm>
             <a:off x="22436130" y="25034949"/>
-            <a:ext cx="9419273" cy="6863416"/>
+            <a:ext cx="9419273" cy="2800766"/>
           </a:xfrm>
           <a:prstGeom prst="rect">
             <a:avLst/>
@@ -27452,166 +27488,35 @@
                   <a:schemeClr val="dk1"/>
                 </a:solidFill>
               </a:rPr>
-              <a:t>The web client receives the data from the server and generates the graph visualization.</a:t>
-            </a:r>
-          </a:p>
-          <a:p>
-            <a:pPr lvl="0">
-              <a:buClr>
-                <a:srgbClr val="000000"/>
-              </a:buClr>
-            </a:pPr>
-            <a:endParaRPr lang="en-US" sz="2200" dirty="0">
-              <a:solidFill>
-                <a:schemeClr val="dk1"/>
-              </a:solidFill>
-            </a:endParaRPr>
-          </a:p>
-          <a:p>
-            <a:pPr lvl="0">
-              <a:buClr>
-                <a:schemeClr val="dk1"/>
-              </a:buClr>
-              <a:buSzPct val="25000"/>
-            </a:pPr>
-            <a:r>
-              <a:rPr lang="en-US" sz="2200" b="1" dirty="0" err="1">
+              <a:t>The web client receives the data from the server and generates the graph visualization</a:t>
+            </a:r>
+            <a:r>
+              <a:rPr lang="en-US" sz="2200" dirty="0" smtClean="0">
                 <a:solidFill>
                   <a:schemeClr val="dk1"/>
                 </a:solidFill>
               </a:rPr>
-              <a:t>GRNsight</a:t>
-            </a:r>
-            <a:r>
-              <a:rPr lang="en-US" sz="2200" b="1" dirty="0">
+              <a:t>.</a:t>
+            </a:r>
+          </a:p>
+          <a:p>
+            <a:pPr marL="457200" lvl="0" indent="-457200">
+              <a:buClr>
+                <a:schemeClr val="dk1"/>
+              </a:buClr>
+              <a:buSzPct val="100000"/>
+              <a:buFont typeface="Arial"/>
+              <a:buChar char="•"/>
+            </a:pPr>
+            <a:r>
+              <a:rPr lang="en-US" sz="2200" dirty="0" smtClean="0">
                 <a:solidFill>
                   <a:schemeClr val="dk1"/>
                 </a:solidFill>
               </a:rPr>
-              <a:t> implementation takes advantage of other open source tools</a:t>
-            </a:r>
-          </a:p>
-          <a:p>
-            <a:pPr marL="457200" lvl="0" indent="-457200">
-              <a:buClr>
-                <a:schemeClr val="dk1"/>
-              </a:buClr>
-              <a:buSzPct val="100000"/>
-              <a:buFont typeface="Arial"/>
-              <a:buChar char="•"/>
-            </a:pPr>
-            <a:r>
-              <a:rPr lang="en-US" sz="2200" dirty="0" err="1">
-                <a:solidFill>
-                  <a:schemeClr val="dk1"/>
-                </a:solidFill>
-              </a:rPr>
-              <a:t>GRNsight</a:t>
-            </a:r>
-            <a:r>
-              <a:rPr lang="en-US" sz="2200" dirty="0">
-                <a:solidFill>
-                  <a:schemeClr val="dk1"/>
-                </a:solidFill>
-              </a:rPr>
-              <a:t> uses the Data-Driven Documents (D3) JavaScript library to generate a graph derived from input network data.</a:t>
-            </a:r>
-          </a:p>
-          <a:p>
-            <a:pPr marL="457200" lvl="0" indent="-457200">
-              <a:buClr>
-                <a:schemeClr val="dk1"/>
-              </a:buClr>
-              <a:buSzPct val="100000"/>
-              <a:buFont typeface="Arial"/>
-              <a:buChar char="•"/>
-            </a:pPr>
-            <a:r>
-              <a:rPr lang="en-US" sz="2200" dirty="0">
-                <a:solidFill>
-                  <a:schemeClr val="dk1"/>
-                </a:solidFill>
-              </a:rPr>
-              <a:t>D3 dynamically manipulates HTML and Scalable Vector Graphics (SVG) to form the elements of the graph.</a:t>
-            </a:r>
-          </a:p>
-          <a:p>
-            <a:pPr marL="1141413" lvl="1" indent="-455613">
-              <a:buClr>
-                <a:schemeClr val="dk1"/>
-              </a:buClr>
-              <a:buSzPct val="100000"/>
-              <a:buFont typeface="Arial"/>
-              <a:buChar char="•"/>
-            </a:pPr>
-            <a:r>
-              <a:rPr lang="en-US" sz="2200" dirty="0" err="1">
-                <a:solidFill>
-                  <a:schemeClr val="dk1"/>
-                </a:solidFill>
-              </a:rPr>
-              <a:t>GRNsight</a:t>
-            </a:r>
-            <a:r>
-              <a:rPr lang="en-US" sz="2200" dirty="0">
-                <a:solidFill>
-                  <a:schemeClr val="dk1"/>
-                </a:solidFill>
-              </a:rPr>
-              <a:t> implements D3’s force layout which applies a physics-based simulation to the graph.</a:t>
-            </a:r>
-          </a:p>
-          <a:p>
-            <a:pPr marL="457200" lvl="0" indent="-457200">
-              <a:buClr>
-                <a:schemeClr val="dk1"/>
-              </a:buClr>
-              <a:buSzPct val="100000"/>
-              <a:buFont typeface="Arial"/>
-              <a:buChar char="•"/>
-            </a:pPr>
-            <a:r>
-              <a:rPr lang="en-US" sz="2200" dirty="0">
-                <a:solidFill>
-                  <a:schemeClr val="dk1"/>
-                </a:solidFill>
-              </a:rPr>
-              <a:t>D3 also allows for the fine tuning of Cascading Style Sheets (CSS), the code that styles web pages</a:t>
-            </a:r>
-            <a:r>
-              <a:rPr lang="en-US" sz="2200" dirty="0" smtClean="0">
-                <a:solidFill>
-                  <a:schemeClr val="dk1"/>
-                </a:solidFill>
-              </a:rPr>
-              <a:t>.</a:t>
-            </a:r>
-          </a:p>
-          <a:p>
-            <a:pPr marL="457200" indent="-457200">
-              <a:buClr>
-                <a:schemeClr val="dk1"/>
-              </a:buClr>
-              <a:buSzPct val="100000"/>
-              <a:buFont typeface="Arial"/>
-              <a:buChar char="•"/>
-            </a:pPr>
-            <a:r>
-              <a:rPr lang="en-US" sz="2200" dirty="0" err="1"/>
-              <a:t>GRNsight</a:t>
-            </a:r>
-            <a:r>
-              <a:rPr lang="en-US" sz="2200" dirty="0"/>
-              <a:t> follows an open development model using an open source </a:t>
-            </a:r>
-            <a:r>
-              <a:rPr lang="en-US" sz="2200" dirty="0" err="1"/>
-              <a:t>github.com</a:t>
-            </a:r>
-            <a:r>
-              <a:rPr lang="en-US" sz="2200" dirty="0"/>
-              <a:t> code repository and issue tracking.</a:t>
-            </a:r>
+              <a:t>The user interface is compatible with Firefox and Chrome browsers.</a:t>
+            </a:r>
+            <a:endParaRPr lang="en-US" sz="2200" dirty="0"/>
           </a:p>
           <a:p>
             <a:pPr marL="457200" lvl="0" indent="-457200">
@@ -29092,21 +28997,22 @@
       </p:pic>
       <p:sp>
         <p:nvSpPr>
-          <p:cNvPr id="21" name="Rectangle 20"/>
-          <p:cNvSpPr/>
+          <p:cNvPr id="2" name="TextBox 1"/>
+          <p:cNvSpPr txBox="1"/>
           <p:nvPr/>
         </p:nvSpPr>
         <p:spPr>
           <a:xfrm>
-            <a:off x="28322711" y="14537514"/>
-            <a:ext cx="3528154" cy="2462212"/>
+            <a:off x="17754600" y="27937617"/>
+            <a:ext cx="13984937" cy="2800766"/>
           </a:xfrm>
           <a:prstGeom prst="rect">
             <a:avLst/>
           </a:prstGeom>
+          <a:noFill/>
         </p:spPr>
         <p:txBody>
-          <a:bodyPr wrap="square">
+          <a:bodyPr wrap="square" rtlCol="0">
             <a:spAutoFit/>
           </a:bodyPr>
           <a:lstStyle/>
@@ -29118,16 +29024,24 @@
               <a:buSzPct val="25000"/>
             </a:pPr>
             <a:r>
+              <a:rPr lang="en-US" sz="2200" b="1" dirty="0" err="1">
+                <a:solidFill>
+                  <a:schemeClr val="dk1"/>
+                </a:solidFill>
+              </a:rPr>
+              <a:t>GRNsight</a:t>
+            </a:r>
+            <a:r>
               <a:rPr lang="en-US" sz="2200" b="1" dirty="0">
                 <a:solidFill>
                   <a:schemeClr val="dk1"/>
                 </a:solidFill>
               </a:rPr>
-              <a:t>The User Interface is compatible with Firefox and Chrome browsers</a:t>
-            </a:r>
-          </a:p>
-          <a:p>
-            <a:pPr marL="342900" lvl="0" indent="-342900">
+              <a:t> implementation takes advantage of other open source tools</a:t>
+            </a:r>
+          </a:p>
+          <a:p>
+            <a:pPr marL="457200" lvl="0" indent="-457200">
               <a:buClr>
                 <a:schemeClr val="dk1"/>
               </a:buClr>
@@ -29136,47 +29050,110 @@
               <a:buChar char="•"/>
             </a:pPr>
             <a:r>
+              <a:rPr lang="en-US" sz="2200" dirty="0" err="1">
+                <a:solidFill>
+                  <a:schemeClr val="dk1"/>
+                </a:solidFill>
+              </a:rPr>
+              <a:t>GRNsight</a:t>
+            </a:r>
+            <a:r>
               <a:rPr lang="en-US" sz="2200" dirty="0">
                 <a:solidFill>
                   <a:schemeClr val="dk1"/>
                 </a:solidFill>
               </a:rPr>
-              <a:t>File upload is via simple HTML form element</a:t>
-            </a:r>
-            <a:r>
-              <a:rPr lang="en-US" sz="2200" dirty="0" smtClean="0">
+              <a:t> uses the Data-Driven Documents (D3) JavaScript library to generate a graph derived from input network data.</a:t>
+            </a:r>
+          </a:p>
+          <a:p>
+            <a:pPr marL="457200" lvl="0" indent="-457200">
+              <a:buClr>
+                <a:schemeClr val="dk1"/>
+              </a:buClr>
+              <a:buSzPct val="100000"/>
+              <a:buFont typeface="Arial"/>
+              <a:buChar char="•"/>
+            </a:pPr>
+            <a:r>
+              <a:rPr lang="en-US" sz="2200" dirty="0">
                 <a:solidFill>
                   <a:schemeClr val="dk1"/>
                 </a:solidFill>
               </a:rPr>
-              <a:t>.</a:t>
-            </a:r>
-          </a:p>
-          <a:p>
-            <a:pPr lvl="0">
+              <a:t>D3 dynamically manipulates HTML and Scalable Vector Graphics (SVG) to form the elements of the graph.</a:t>
+            </a:r>
+          </a:p>
+          <a:p>
+            <a:pPr marL="1141413" lvl="1" indent="-455613">
               <a:buClr>
                 <a:schemeClr val="dk1"/>
               </a:buClr>
               <a:buSzPct val="100000"/>
-            </a:pPr>
-            <a:endParaRPr lang="en-US" sz="2200" dirty="0">
-              <a:solidFill>
-                <a:schemeClr val="dk1"/>
-              </a:solidFill>
-            </a:endParaRPr>
-          </a:p>
-          <a:p>
-            <a:pPr lvl="0">
+              <a:buFont typeface="Arial"/>
+              <a:buChar char="•"/>
+            </a:pPr>
+            <a:r>
+              <a:rPr lang="en-US" sz="2200" dirty="0" err="1">
+                <a:solidFill>
+                  <a:schemeClr val="dk1"/>
+                </a:solidFill>
+              </a:rPr>
+              <a:t>GRNsight</a:t>
+            </a:r>
+            <a:r>
+              <a:rPr lang="en-US" sz="2200" dirty="0">
+                <a:solidFill>
+                  <a:schemeClr val="dk1"/>
+                </a:solidFill>
+              </a:rPr>
+              <a:t> implements D3’s force layout which applies a physics-based simulation to the graph.</a:t>
+            </a:r>
+          </a:p>
+          <a:p>
+            <a:pPr marL="457200" lvl="0" indent="-457200">
               <a:buClr>
                 <a:schemeClr val="dk1"/>
               </a:buClr>
               <a:buSzPct val="100000"/>
-            </a:pPr>
-            <a:endParaRPr lang="en-US" sz="2200" dirty="0">
-              <a:solidFill>
-                <a:schemeClr val="dk1"/>
-              </a:solidFill>
-            </a:endParaRPr>
+              <a:buFont typeface="Arial"/>
+              <a:buChar char="•"/>
+            </a:pPr>
+            <a:r>
+              <a:rPr lang="en-US" sz="2200" dirty="0">
+                <a:solidFill>
+                  <a:schemeClr val="dk1"/>
+                </a:solidFill>
+              </a:rPr>
+              <a:t>D3 also allows for the fine tuning of Cascading Style Sheets (CSS), the code that styles web pages.</a:t>
+            </a:r>
+          </a:p>
+          <a:p>
+            <a:pPr marL="457200" indent="-457200">
+              <a:buClr>
+                <a:schemeClr val="dk1"/>
+              </a:buClr>
+              <a:buSzPct val="100000"/>
+              <a:buFont typeface="Arial"/>
+              <a:buChar char="•"/>
+            </a:pPr>
+            <a:r>
+              <a:rPr lang="en-US" sz="2200" dirty="0" err="1"/>
+              <a:t>GRNsight</a:t>
+            </a:r>
+            <a:r>
+              <a:rPr lang="en-US" sz="2200" dirty="0"/>
+              <a:t> follows an open development model using an open source </a:t>
+            </a:r>
+            <a:r>
+              <a:rPr lang="en-US" sz="2200" dirty="0" err="1"/>
+              <a:t>github.com</a:t>
+            </a:r>
+            <a:r>
+              <a:rPr lang="en-US" sz="2200" dirty="0"/>
+              <a:t> code repository and issue tracking.</a:t>
+            </a:r>
+            <a:endParaRPr lang="en-US" dirty="0"/>
           </a:p>
         </p:txBody>
       </p:sp>

</xml_diff>

<commit_message>
More changes to the poster.
</commit_message>
<xml_diff>
--- a/documents/Anguiano_Varshneya_LMU_Symposium_2015.pptx
+++ b/documents/Anguiano_Varshneya_LMU_Symposium_2015.pptx
@@ -22624,39 +22624,12 @@
       </p:sp>
       <p:pic>
         <p:nvPicPr>
-          <p:cNvPr id="86" name="Shape 86"/>
+          <p:cNvPr id="113" name="Shape 113"/>
           <p:cNvPicPr preferRelativeResize="0"/>
           <p:nvPr/>
         </p:nvPicPr>
         <p:blipFill rotWithShape="1">
           <a:blip r:embed="rId3">
-            <a:alphaModFix/>
-          </a:blip>
-          <a:srcRect/>
-          <a:stretch/>
-        </p:blipFill>
-        <p:spPr>
-          <a:xfrm>
-            <a:off x="1743591" y="1186383"/>
-            <a:ext cx="5099868" cy="3008923"/>
-          </a:xfrm>
-          <a:prstGeom prst="rect">
-            <a:avLst/>
-          </a:prstGeom>
-          <a:noFill/>
-          <a:ln>
-            <a:noFill/>
-          </a:ln>
-        </p:spPr>
-      </p:pic>
-      <p:pic>
-        <p:nvPicPr>
-          <p:cNvPr id="113" name="Shape 113"/>
-          <p:cNvPicPr preferRelativeResize="0"/>
-          <p:nvPr/>
-        </p:nvPicPr>
-        <p:blipFill rotWithShape="1">
-          <a:blip r:embed="rId4">
             <a:alphaModFix/>
           </a:blip>
           <a:srcRect/>
@@ -22720,46 +22693,16 @@
               <a:buFont typeface="Arial"/>
               <a:buNone/>
             </a:pPr>
-            <a:r>
-              <a:rPr lang="en-US" sz="900" b="0" i="0" u="none" strike="noStrike" cap="none" baseline="0" dirty="0">
-                <a:solidFill>
-                  <a:srgbClr val="222222"/>
-                </a:solidFill>
-                <a:latin typeface="Arial"/>
-                <a:ea typeface="Arial"/>
-                <a:cs typeface="Arial"/>
-                <a:sym typeface="Arial"/>
-                <a:rtl val="0"/>
-              </a:rPr>
-              <a:t>MATLAB model available at </a:t>
-            </a:r>
-            <a:r>
-              <a:rPr lang="en-US" sz="900" b="0" i="0" u="sng" strike="noStrike" cap="none" baseline="0" dirty="0">
-                <a:solidFill>
-                  <a:schemeClr val="hlink"/>
-                </a:solidFill>
-                <a:latin typeface="Arial"/>
-                <a:ea typeface="Arial"/>
-                <a:cs typeface="Arial"/>
-                <a:sym typeface="Arial"/>
-                <a:hlinkClick r:id="rId5"/>
-                <a:rtl val="0"/>
-              </a:rPr>
-              <a:t>http://kdahlquist.github.io/GRNmap/</a:t>
-            </a:r>
-            <a:r>
-              <a:rPr lang="en-US" sz="2800" b="0" i="0" u="none" strike="noStrike" cap="none" baseline="0" dirty="0">
-                <a:solidFill>
-                  <a:schemeClr val="dk1"/>
-                </a:solidFill>
-                <a:latin typeface="Arial"/>
-                <a:ea typeface="Arial"/>
-                <a:cs typeface="Arial"/>
-                <a:sym typeface="Arial"/>
-                <a:rtl val="0"/>
-              </a:rPr>
-              <a:t> </a:t>
-            </a:r>
+            <a:endParaRPr lang="en-US" sz="2800" b="0" i="0" u="none" strike="noStrike" cap="none" baseline="0" dirty="0">
+              <a:solidFill>
+                <a:schemeClr val="dk1"/>
+              </a:solidFill>
+              <a:latin typeface="Arial"/>
+              <a:ea typeface="Arial"/>
+              <a:cs typeface="Arial"/>
+              <a:sym typeface="Arial"/>
+              <a:rtl val="0"/>
+            </a:endParaRPr>
           </a:p>
         </p:txBody>
       </p:sp>
@@ -23570,7 +23513,7 @@
           <p:nvPr/>
         </p:nvPicPr>
         <p:blipFill rotWithShape="1">
-          <a:blip r:embed="rId6">
+          <a:blip r:embed="rId4">
             <a:alphaModFix/>
           </a:blip>
           <a:srcRect/>
@@ -23597,7 +23540,7 @@
           <p:nvPr/>
         </p:nvPicPr>
         <p:blipFill rotWithShape="1">
-          <a:blip r:embed="rId7">
+          <a:blip r:embed="rId5">
             <a:alphaModFix/>
           </a:blip>
           <a:srcRect r="10182"/>
@@ -23624,7 +23567,7 @@
           <p:nvPr/>
         </p:nvPicPr>
         <p:blipFill rotWithShape="1">
-          <a:blip r:embed="rId8">
+          <a:blip r:embed="rId6">
             <a:alphaModFix/>
           </a:blip>
           <a:srcRect l="27345" t="34020" b="29849"/>
@@ -23653,7 +23596,7 @@
         <p:spPr>
           <a:xfrm>
             <a:off x="835487" y="18196790"/>
-            <a:ext cx="9754534" cy="9991790"/>
+            <a:ext cx="9754534" cy="6492010"/>
           </a:xfrm>
           <a:prstGeom prst="rect">
             <a:avLst/>
@@ -24246,7 +24189,7 @@
               <a:buChar char="•"/>
             </a:pPr>
             <a:r>
-              <a:rPr lang="en-US" sz="2200" b="0" i="0" u="none" strike="noStrike" cap="none" baseline="0" dirty="0">
+              <a:rPr lang="en-US" sz="2200" b="0" i="0" u="none" strike="noStrike" cap="none" baseline="0" dirty="0" smtClean="0">
                 <a:solidFill>
                   <a:schemeClr val="dk1"/>
                 </a:solidFill>
@@ -24256,29 +24199,10 @@
                 <a:sym typeface="Arial"/>
                 <a:rtl val="0"/>
               </a:rPr>
-              <a:t>0 represents no relationship.</a:t>
-            </a:r>
-          </a:p>
-          <a:p>
-            <a:pPr marL="342900" marR="0" lvl="0" indent="-342900" algn="l" rtl="0">
-              <a:lnSpc>
-                <a:spcPct val="100000"/>
-              </a:lnSpc>
-              <a:spcBef>
-                <a:spcPts val="0"/>
-              </a:spcBef>
-              <a:spcAft>
-                <a:spcPts val="0"/>
-              </a:spcAft>
-              <a:buClr>
-                <a:schemeClr val="dk1"/>
-              </a:buClr>
-              <a:buSzPct val="100000"/>
-              <a:buFont typeface="Arial"/>
-              <a:buChar char="•"/>
-            </a:pPr>
-            <a:r>
-              <a:rPr lang="en-US" sz="2200" b="0" i="0" u="none" strike="noStrike" cap="none" baseline="0" dirty="0">
+              <a:t>The </a:t>
+            </a:r>
+            <a:r>
+              <a:rPr lang="en-US" sz="2200" b="0" i="0" u="none" strike="noStrike" cap="none" baseline="0" dirty="0" smtClean="0">
                 <a:solidFill>
                   <a:schemeClr val="dk1"/>
                 </a:solidFill>
@@ -24288,149 +24212,7 @@
                 <a:sym typeface="Arial"/>
                 <a:rtl val="0"/>
               </a:rPr>
-              <a:t>A positive </a:t>
-            </a:r>
-            <a:r>
-              <a:rPr lang="en-US" sz="2200" b="0" i="0" u="none" strike="noStrike" cap="none" baseline="0" dirty="0" smtClean="0">
-                <a:solidFill>
-                  <a:schemeClr val="dk1"/>
-                </a:solidFill>
-                <a:latin typeface="Arial"/>
-                <a:ea typeface="Arial"/>
-                <a:cs typeface="Arial"/>
-                <a:sym typeface="Arial"/>
-                <a:rtl val="0"/>
-              </a:rPr>
-              <a:t>weight</a:t>
-            </a:r>
-            <a:r>
-              <a:rPr lang="en-US" sz="2200" b="0" i="0" u="none" strike="noStrike" cap="none" dirty="0" smtClean="0">
-                <a:solidFill>
-                  <a:schemeClr val="dk1"/>
-                </a:solidFill>
-                <a:latin typeface="Arial"/>
-                <a:ea typeface="Arial"/>
-                <a:cs typeface="Arial"/>
-                <a:sym typeface="Arial"/>
-                <a:rtl val="0"/>
-              </a:rPr>
-              <a:t> value</a:t>
-            </a:r>
-            <a:r>
-              <a:rPr lang="en-US" sz="2200" b="0" i="0" u="none" strike="noStrike" cap="none" baseline="0" dirty="0" smtClean="0">
-                <a:solidFill>
-                  <a:schemeClr val="dk1"/>
-                </a:solidFill>
-                <a:latin typeface="Arial"/>
-                <a:ea typeface="Arial"/>
-                <a:cs typeface="Arial"/>
-                <a:sym typeface="Arial"/>
-                <a:rtl val="0"/>
-              </a:rPr>
-              <a:t> </a:t>
-            </a:r>
-            <a:r>
-              <a:rPr lang="en-US" sz="2200" b="0" i="0" u="none" strike="noStrike" cap="none" baseline="0" dirty="0">
-                <a:solidFill>
-                  <a:schemeClr val="dk1"/>
-                </a:solidFill>
-                <a:latin typeface="Arial"/>
-                <a:ea typeface="Arial"/>
-                <a:cs typeface="Arial"/>
-                <a:sym typeface="Arial"/>
-                <a:rtl val="0"/>
-              </a:rPr>
-              <a:t>indicates activation.</a:t>
-            </a:r>
-          </a:p>
-          <a:p>
-            <a:pPr marL="342900" marR="0" lvl="0" indent="-342900" algn="l" rtl="0">
-              <a:lnSpc>
-                <a:spcPct val="100000"/>
-              </a:lnSpc>
-              <a:spcBef>
-                <a:spcPts val="0"/>
-              </a:spcBef>
-              <a:spcAft>
-                <a:spcPts val="0"/>
-              </a:spcAft>
-              <a:buClr>
-                <a:schemeClr val="dk1"/>
-              </a:buClr>
-              <a:buSzPct val="100000"/>
-              <a:buFont typeface="Arial"/>
-              <a:buChar char="•"/>
-            </a:pPr>
-            <a:r>
-              <a:rPr lang="en-US" sz="2200" b="0" i="0" u="none" strike="noStrike" cap="none" baseline="0" dirty="0">
-                <a:solidFill>
-                  <a:schemeClr val="dk1"/>
-                </a:solidFill>
-                <a:latin typeface="Arial"/>
-                <a:ea typeface="Arial"/>
-                <a:cs typeface="Arial"/>
-                <a:sym typeface="Arial"/>
-                <a:rtl val="0"/>
-              </a:rPr>
-              <a:t>A negative </a:t>
-            </a:r>
-            <a:r>
-              <a:rPr lang="en-US" sz="2200" b="0" i="0" u="none" strike="noStrike" cap="none" baseline="0" dirty="0" smtClean="0">
-                <a:solidFill>
-                  <a:schemeClr val="dk1"/>
-                </a:solidFill>
-                <a:latin typeface="Arial"/>
-                <a:ea typeface="Arial"/>
-                <a:cs typeface="Arial"/>
-                <a:sym typeface="Arial"/>
-                <a:rtl val="0"/>
-              </a:rPr>
-              <a:t>weight value </a:t>
-            </a:r>
-            <a:r>
-              <a:rPr lang="en-US" sz="2200" b="0" i="0" u="none" strike="noStrike" cap="none" baseline="0" dirty="0">
-                <a:solidFill>
-                  <a:schemeClr val="dk1"/>
-                </a:solidFill>
-                <a:latin typeface="Arial"/>
-                <a:ea typeface="Arial"/>
-                <a:cs typeface="Arial"/>
-                <a:sym typeface="Arial"/>
-                <a:rtl val="0"/>
-              </a:rPr>
-              <a:t>indicates repression.</a:t>
-            </a:r>
-          </a:p>
-          <a:p>
-            <a:pPr marL="342900" marR="0" lvl="0" indent="-342900" algn="l" rtl="0">
-              <a:lnSpc>
-                <a:spcPct val="100000"/>
-              </a:lnSpc>
-              <a:spcBef>
-                <a:spcPts val="0"/>
-              </a:spcBef>
-              <a:spcAft>
-                <a:spcPts val="0"/>
-              </a:spcAft>
-              <a:buClr>
-                <a:schemeClr val="dk1"/>
-              </a:buClr>
-              <a:buSzPct val="100000"/>
-              <a:buFont typeface="Arial"/>
-              <a:buChar char="•"/>
-            </a:pPr>
-            <a:r>
-              <a:rPr lang="en-US" sz="2200" b="0" i="0" u="none" strike="noStrike" cap="none" baseline="0" dirty="0" smtClean="0">
-                <a:solidFill>
-                  <a:schemeClr val="dk1"/>
-                </a:solidFill>
-                <a:latin typeface="Arial"/>
-                <a:ea typeface="Arial"/>
-                <a:cs typeface="Arial"/>
-                <a:sym typeface="Arial"/>
-                <a:rtl val="0"/>
-              </a:rPr>
-              <a:t>The magnitude of the weight defines the strength of the relationship.</a:t>
+              <a:t>magnitude of the weight defines the strength of the relationship.</a:t>
             </a:r>
           </a:p>
           <a:p>
@@ -24669,8 +24451,8 @@
         </p:nvSpPr>
         <p:spPr>
           <a:xfrm>
-            <a:off x="835483" y="28470371"/>
-            <a:ext cx="9754534" cy="935205"/>
+            <a:off x="835490" y="25133301"/>
+            <a:ext cx="9754534" cy="1109976"/>
           </a:xfrm>
           <a:prstGeom prst="rect">
             <a:avLst/>
@@ -24731,7 +24513,46 @@
                 <a:sym typeface="Arial"/>
                 <a:rtl val="0"/>
               </a:rPr>
-              <a:t> Spreadsheet Requirements</a:t>
+              <a:t> </a:t>
+            </a:r>
+            <a:r>
+              <a:rPr lang="en-US" sz="3600" b="0" i="0" u="none" strike="noStrike" cap="none" baseline="0" dirty="0" smtClean="0">
+                <a:solidFill>
+                  <a:srgbClr val="017C00"/>
+                </a:solidFill>
+                <a:latin typeface="Arial"/>
+                <a:ea typeface="Arial"/>
+                <a:cs typeface="Arial"/>
+                <a:sym typeface="Arial"/>
+                <a:rtl val="0"/>
+              </a:rPr>
+              <a:t>Accepts .</a:t>
+            </a:r>
+            <a:r>
+              <a:rPr lang="en-US" sz="3600" b="0" i="0" u="none" strike="noStrike" cap="none" baseline="0" dirty="0" err="1" smtClean="0">
+                <a:solidFill>
+                  <a:srgbClr val="017C00"/>
+                </a:solidFill>
+                <a:latin typeface="Arial"/>
+                <a:ea typeface="Arial"/>
+                <a:cs typeface="Arial"/>
+                <a:sym typeface="Arial"/>
+                <a:rtl val="0"/>
+              </a:rPr>
+              <a:t>xlsx</a:t>
+            </a:r>
+            <a:r>
+              <a:rPr lang="en-US" sz="3600" b="0" i="0" u="none" strike="noStrike" cap="none" baseline="0" dirty="0" smtClean="0">
+                <a:solidFill>
+                  <a:srgbClr val="017C00"/>
+                </a:solidFill>
+                <a:latin typeface="Arial"/>
+                <a:ea typeface="Arial"/>
+                <a:cs typeface="Arial"/>
+                <a:sym typeface="Arial"/>
+                <a:rtl val="0"/>
+              </a:rPr>
+              <a:t> Files in the Proper Format</a:t>
             </a:r>
             <a:endParaRPr lang="en-US" sz="3600" b="0" i="0" u="none" strike="noStrike" cap="none" baseline="0" dirty="0">
               <a:solidFill>
@@ -24754,8 +24575,8 @@
         </p:nvSpPr>
         <p:spPr>
           <a:xfrm>
-            <a:off x="835486" y="29405578"/>
-            <a:ext cx="9754534" cy="2675921"/>
+            <a:off x="835493" y="26243278"/>
+            <a:ext cx="9754534" cy="5838221"/>
           </a:xfrm>
           <a:prstGeom prst="rect">
             <a:avLst/>
@@ -24957,10 +24778,111 @@
               </a:rPr>
               <a:t>adjacency matrix. </a:t>
             </a:r>
-            <a:r>
-              <a:rPr lang="en-US" sz="2200" b="0" i="0" u="none" strike="noStrike" cap="none" baseline="0" dirty="0" err="1">
-                <a:solidFill>
-                  <a:srgbClr val="000000"/>
+            <a:endParaRPr lang="en-US" sz="2200" b="0" i="0" u="none" strike="noStrike" cap="none" baseline="0" dirty="0" smtClean="0">
+              <a:solidFill>
+                <a:schemeClr val="dk1"/>
+              </a:solidFill>
+              <a:latin typeface="Arial"/>
+              <a:ea typeface="Arial"/>
+              <a:cs typeface="Arial"/>
+              <a:sym typeface="Arial"/>
+              <a:rtl val="0"/>
+            </a:endParaRPr>
+          </a:p>
+          <a:p>
+            <a:pPr marL="342900" lvl="0" indent="-342900">
+              <a:buClr>
+                <a:schemeClr val="dk1"/>
+              </a:buClr>
+              <a:buSzPct val="100000"/>
+              <a:buFont typeface="Arial"/>
+              <a:buChar char="•"/>
+            </a:pPr>
+            <a:r>
+              <a:rPr lang="en-US" sz="2200" dirty="0">
+                <a:solidFill>
+                  <a:schemeClr val="dk1"/>
+                </a:solidFill>
+              </a:rPr>
+              <a:t>0 represents no relationship.</a:t>
+            </a:r>
+          </a:p>
+          <a:p>
+            <a:pPr marL="342900" lvl="0" indent="-342900">
+              <a:buClr>
+                <a:schemeClr val="dk1"/>
+              </a:buClr>
+              <a:buSzPct val="100000"/>
+              <a:buFont typeface="Arial"/>
+              <a:buChar char="•"/>
+            </a:pPr>
+            <a:r>
+              <a:rPr lang="en-US" sz="2200" dirty="0">
+                <a:solidFill>
+                  <a:schemeClr val="dk1"/>
+                </a:solidFill>
+              </a:rPr>
+              <a:t>A positive weight value indicates activation.</a:t>
+            </a:r>
+          </a:p>
+          <a:p>
+            <a:pPr marL="342900" lvl="0" indent="-342900">
+              <a:buClr>
+                <a:schemeClr val="dk1"/>
+              </a:buClr>
+              <a:buSzPct val="100000"/>
+              <a:buFont typeface="Arial"/>
+              <a:buChar char="•"/>
+            </a:pPr>
+            <a:r>
+              <a:rPr lang="en-US" sz="2200" dirty="0">
+                <a:solidFill>
+                  <a:schemeClr val="dk1"/>
+                </a:solidFill>
+              </a:rPr>
+              <a:t>A negative weight value indicates repression</a:t>
+            </a:r>
+            <a:r>
+              <a:rPr lang="en-US" sz="2200" dirty="0" smtClean="0">
+                <a:solidFill>
+                  <a:schemeClr val="dk1"/>
+                </a:solidFill>
+              </a:rPr>
+              <a:t>.</a:t>
+            </a:r>
+            <a:endParaRPr lang="en-US" sz="2200" b="0" i="0" u="none" strike="noStrike" cap="none" baseline="0" dirty="0" smtClean="0">
+              <a:solidFill>
+                <a:schemeClr val="dk1"/>
+              </a:solidFill>
+              <a:latin typeface="Arial"/>
+              <a:ea typeface="Arial"/>
+              <a:cs typeface="Arial"/>
+              <a:sym typeface="Arial"/>
+              <a:rtl val="0"/>
+            </a:endParaRPr>
+          </a:p>
+          <a:p>
+            <a:pPr marL="342900" marR="0" lvl="0" indent="-342900" algn="l" rtl="0">
+              <a:lnSpc>
+                <a:spcPct val="100000"/>
+              </a:lnSpc>
+              <a:spcBef>
+                <a:spcPts val="0"/>
+              </a:spcBef>
+              <a:spcAft>
+                <a:spcPts val="0"/>
+              </a:spcAft>
+              <a:buClr>
+                <a:schemeClr val="dk1"/>
+              </a:buClr>
+              <a:buSzPct val="100000"/>
+              <a:buFont typeface="Arial"/>
+              <a:buChar char="•"/>
+            </a:pPr>
+            <a:r>
+              <a:rPr lang="en-US" sz="2200" b="0" i="0" u="none" strike="noStrike" cap="none" baseline="0" dirty="0" err="1" smtClean="0">
+                <a:solidFill>
+                  <a:schemeClr val="dk1"/>
                 </a:solidFill>
                 <a:latin typeface="Arial"/>
                 <a:ea typeface="Arial"/>
@@ -24968,12 +24890,12 @@
                 <a:sym typeface="Arial"/>
                 <a:rtl val="0"/>
               </a:rPr>
-              <a:t>GRNsight</a:t>
-            </a:r>
-            <a:r>
-              <a:rPr lang="en-US" sz="2200" b="0" i="0" u="none" strike="noStrike" cap="none" baseline="0" dirty="0">
-                <a:solidFill>
-                  <a:srgbClr val="000000"/>
+              <a:t>GRNmap</a:t>
+            </a:r>
+            <a:r>
+              <a:rPr lang="en-US" sz="2200" b="0" i="0" u="none" strike="noStrike" cap="none" baseline="0" dirty="0" smtClean="0">
+                <a:solidFill>
+                  <a:schemeClr val="dk1"/>
                 </a:solidFill>
                 <a:latin typeface="Arial"/>
                 <a:ea typeface="Arial"/>
@@ -24984,9 +24906,9 @@
               <a:t> </a:t>
             </a:r>
             <a:r>
-              <a:rPr lang="en-US" sz="2200" b="0" i="0" u="none" strike="noStrike" cap="none" baseline="0" dirty="0" smtClean="0">
-                <a:solidFill>
-                  <a:srgbClr val="000000"/>
+              <a:rPr lang="en-US" sz="2200" b="0" i="0" u="none" strike="noStrike" cap="none" baseline="0" dirty="0">
+                <a:solidFill>
+                  <a:schemeClr val="dk1"/>
                 </a:solidFill>
                 <a:latin typeface="Arial"/>
                 <a:ea typeface="Arial"/>
@@ -24994,12 +24916,31 @@
                 <a:sym typeface="Arial"/>
                 <a:rtl val="0"/>
               </a:rPr>
-              <a:t>can then </a:t>
-            </a:r>
+              <a:t>input and output spreadsheets are accepted without adjustment.</a:t>
+            </a:r>
+          </a:p>
+          <a:p>
+            <a:pPr marL="342900" marR="0" lvl="0" indent="-342900" algn="l" rtl="0">
+              <a:lnSpc>
+                <a:spcPct val="100000"/>
+              </a:lnSpc>
+              <a:spcBef>
+                <a:spcPts val="0"/>
+              </a:spcBef>
+              <a:spcAft>
+                <a:spcPts val="0"/>
+              </a:spcAft>
+              <a:buClr>
+                <a:schemeClr val="dk1"/>
+              </a:buClr>
+              <a:buSzPct val="100000"/>
+              <a:buFont typeface="Arial"/>
+              <a:buChar char="•"/>
+            </a:pPr>
             <a:r>
               <a:rPr lang="en-US" sz="2200" b="0" i="0" u="none" strike="noStrike" cap="none" baseline="0" dirty="0">
                 <a:solidFill>
-                  <a:srgbClr val="000000"/>
+                  <a:schemeClr val="dk1"/>
                 </a:solidFill>
                 <a:latin typeface="Arial"/>
                 <a:ea typeface="Arial"/>
@@ -25007,115 +24948,11 @@
                 <a:sym typeface="Arial"/>
                 <a:rtl val="0"/>
               </a:rPr>
-              <a:t>automatically lay out the graph based on the adjacency matrix.</a:t>
-            </a:r>
-          </a:p>
-          <a:p>
-            <a:pPr marL="342900" marR="0" lvl="0" indent="-342900" algn="l" rtl="0">
-              <a:lnSpc>
-                <a:spcPct val="100000"/>
-              </a:lnSpc>
-              <a:spcBef>
-                <a:spcPts val="0"/>
-              </a:spcBef>
-              <a:spcAft>
-                <a:spcPts val="0"/>
-              </a:spcAft>
-              <a:buClr>
-                <a:schemeClr val="dk1"/>
-              </a:buClr>
-              <a:buSzPct val="100000"/>
-              <a:buFont typeface="Arial"/>
-              <a:buChar char="•"/>
-            </a:pPr>
-            <a:r>
-              <a:rPr lang="en-US" sz="2200" b="0" i="0" u="none" strike="noStrike" cap="none" baseline="0" dirty="0" err="1">
-                <a:solidFill>
-                  <a:schemeClr val="dk1"/>
-                </a:solidFill>
-                <a:latin typeface="Arial"/>
-                <a:ea typeface="Arial"/>
-                <a:cs typeface="Arial"/>
-                <a:sym typeface="Arial"/>
-                <a:rtl val="0"/>
-              </a:rPr>
-              <a:t>GRNmap</a:t>
-            </a:r>
-            <a:r>
-              <a:rPr lang="en-US" sz="2200" b="0" i="0" u="none" strike="noStrike" cap="none" baseline="0" dirty="0">
-                <a:solidFill>
-                  <a:schemeClr val="dk1"/>
-                </a:solidFill>
-                <a:latin typeface="Arial"/>
-                <a:ea typeface="Arial"/>
-                <a:cs typeface="Arial"/>
-                <a:sym typeface="Arial"/>
-                <a:rtl val="0"/>
-              </a:rPr>
-              <a:t> input and output spreadsheets are accepted without adjustment.</a:t>
-            </a:r>
-          </a:p>
-          <a:p>
-            <a:pPr marL="342900" marR="0" lvl="0" indent="-342900" algn="l" rtl="0">
-              <a:lnSpc>
-                <a:spcPct val="100000"/>
-              </a:lnSpc>
-              <a:spcBef>
-                <a:spcPts val="0"/>
-              </a:spcBef>
-              <a:spcAft>
-                <a:spcPts val="0"/>
-              </a:spcAft>
-              <a:buClr>
-                <a:schemeClr val="dk1"/>
-              </a:buClr>
-              <a:buSzPct val="100000"/>
-              <a:buFont typeface="Arial"/>
-              <a:buChar char="•"/>
-            </a:pPr>
-            <a:r>
-              <a:rPr lang="en-US" sz="2200" b="0" i="0" u="none" strike="noStrike" cap="none" baseline="0" dirty="0">
-                <a:solidFill>
-                  <a:schemeClr val="dk1"/>
-                </a:solidFill>
-                <a:latin typeface="Arial"/>
-                <a:ea typeface="Arial"/>
-                <a:cs typeface="Arial"/>
-                <a:sym typeface="Arial"/>
-                <a:rtl val="0"/>
-              </a:rPr>
               <a:t>Spreadsheets from databases such as YEASTRACT can be used with some modification.</a:t>
             </a:r>
           </a:p>
         </p:txBody>
       </p:sp>
-      <p:pic>
-        <p:nvPicPr>
-          <p:cNvPr id="66" name="Shape 107"/>
-          <p:cNvPicPr preferRelativeResize="0"/>
-          <p:nvPr/>
-        </p:nvPicPr>
-        <p:blipFill rotWithShape="1">
-          <a:blip r:embed="rId9">
-            <a:alphaModFix/>
-          </a:blip>
-          <a:srcRect/>
-          <a:stretch/>
-        </p:blipFill>
-        <p:spPr>
-          <a:xfrm>
-            <a:off x="997579" y="25940401"/>
-            <a:ext cx="9430342" cy="2178162"/>
-          </a:xfrm>
-          <a:prstGeom prst="rect">
-            <a:avLst/>
-          </a:prstGeom>
-          <a:noFill/>
-          <a:ln>
-            <a:noFill/>
-          </a:ln>
-        </p:spPr>
-      </p:pic>
       <p:pic>
         <p:nvPicPr>
           <p:cNvPr id="67" name="Shape 115"/>
@@ -25123,7 +24960,7 @@
           <p:nvPr/>
         </p:nvPicPr>
         <p:blipFill rotWithShape="1">
-          <a:blip r:embed="rId10">
+          <a:blip r:embed="rId7">
             <a:alphaModFix/>
           </a:blip>
           <a:srcRect l="8866" t="1807" r="7142" b="3158"/>
@@ -25152,7 +24989,7 @@
           <p:nvPr/>
         </p:nvPicPr>
         <p:blipFill>
-          <a:blip r:embed="rId11"/>
+          <a:blip r:embed="rId8"/>
           <a:stretch>
             <a:fillRect/>
           </a:stretch>
@@ -25607,7 +25444,7 @@
               <a:buChar char="•"/>
             </a:pPr>
             <a:r>
-              <a:rPr lang="en-US" sz="2200" b="0" i="0" u="none" strike="noStrike" cap="none" baseline="0">
+              <a:rPr lang="en-US" sz="2200" b="0" i="0" u="none" strike="noStrike" cap="none" baseline="0" dirty="0" err="1">
                 <a:solidFill>
                   <a:schemeClr val="dk1"/>
                 </a:solidFill>
@@ -25617,7 +25454,143 @@
                 <a:sym typeface="Arial"/>
                 <a:rtl val="0"/>
               </a:rPr>
-              <a:t>GRNsight is free and open to all users and there is no login requirement.  Web site content is available under the Creative Commons Attribution Non-Commercial Share Alike license. GRNsight code is available under the open source BSD license.</a:t>
+              <a:t>GRNsight</a:t>
+            </a:r>
+            <a:r>
+              <a:rPr lang="en-US" sz="2200" b="0" i="0" u="none" strike="noStrike" cap="none" baseline="0" dirty="0">
+                <a:solidFill>
+                  <a:schemeClr val="dk1"/>
+                </a:solidFill>
+                <a:latin typeface="Arial"/>
+                <a:ea typeface="Arial"/>
+                <a:cs typeface="Arial"/>
+                <a:sym typeface="Arial"/>
+                <a:rtl val="0"/>
+              </a:rPr>
+              <a:t> is free and open to all users and there is no login requirement.  </a:t>
+            </a:r>
+            <a:endParaRPr lang="en-US" sz="2200" b="0" i="0" u="none" strike="noStrike" cap="none" baseline="0" dirty="0" smtClean="0">
+              <a:solidFill>
+                <a:schemeClr val="dk1"/>
+              </a:solidFill>
+              <a:latin typeface="Arial"/>
+              <a:ea typeface="Arial"/>
+              <a:cs typeface="Arial"/>
+              <a:sym typeface="Arial"/>
+              <a:rtl val="0"/>
+            </a:endParaRPr>
+          </a:p>
+          <a:p>
+            <a:pPr marL="457200" marR="0" lvl="0" indent="-342900" algn="l" rtl="0">
+              <a:lnSpc>
+                <a:spcPct val="100000"/>
+              </a:lnSpc>
+              <a:spcBef>
+                <a:spcPts val="0"/>
+              </a:spcBef>
+              <a:spcAft>
+                <a:spcPts val="0"/>
+              </a:spcAft>
+              <a:buClr>
+                <a:srgbClr val="333333"/>
+              </a:buClr>
+              <a:buSzPct val="100000"/>
+              <a:buFont typeface="Arial"/>
+              <a:buChar char="•"/>
+            </a:pPr>
+            <a:r>
+              <a:rPr lang="en-US" sz="2200" b="0" i="0" u="none" strike="noStrike" cap="none" baseline="0" dirty="0" smtClean="0">
+                <a:solidFill>
+                  <a:schemeClr val="dk1"/>
+                </a:solidFill>
+                <a:latin typeface="Arial"/>
+                <a:ea typeface="Arial"/>
+                <a:cs typeface="Arial"/>
+                <a:sym typeface="Arial"/>
+                <a:rtl val="0"/>
+              </a:rPr>
+              <a:t>Web </a:t>
+            </a:r>
+            <a:r>
+              <a:rPr lang="en-US" sz="2200" b="0" i="0" u="none" strike="noStrike" cap="none" baseline="0" dirty="0">
+                <a:solidFill>
+                  <a:schemeClr val="dk1"/>
+                </a:solidFill>
+                <a:latin typeface="Arial"/>
+                <a:ea typeface="Arial"/>
+                <a:cs typeface="Arial"/>
+                <a:sym typeface="Arial"/>
+                <a:rtl val="0"/>
+              </a:rPr>
+              <a:t>site content is available under the Creative Commons Attribution Non-Commercial Share Alike license. </a:t>
+            </a:r>
+            <a:endParaRPr lang="en-US" sz="2200" b="0" i="0" u="none" strike="noStrike" cap="none" baseline="0" dirty="0" smtClean="0">
+              <a:solidFill>
+                <a:schemeClr val="dk1"/>
+              </a:solidFill>
+              <a:latin typeface="Arial"/>
+              <a:ea typeface="Arial"/>
+              <a:cs typeface="Arial"/>
+              <a:sym typeface="Arial"/>
+              <a:rtl val="0"/>
+            </a:endParaRPr>
+          </a:p>
+          <a:p>
+            <a:pPr marL="457200" marR="0" lvl="0" indent="-342900" algn="l" rtl="0">
+              <a:lnSpc>
+                <a:spcPct val="100000"/>
+              </a:lnSpc>
+              <a:spcBef>
+                <a:spcPts val="0"/>
+              </a:spcBef>
+              <a:spcAft>
+                <a:spcPts val="0"/>
+              </a:spcAft>
+              <a:buClr>
+                <a:srgbClr val="333333"/>
+              </a:buClr>
+              <a:buSzPct val="100000"/>
+              <a:buFont typeface="Arial"/>
+              <a:buChar char="•"/>
+            </a:pPr>
+            <a:r>
+              <a:rPr lang="en-US" sz="2200" b="0" i="0" u="none" strike="noStrike" cap="none" baseline="0" dirty="0" err="1" smtClean="0">
+                <a:solidFill>
+                  <a:schemeClr val="dk1"/>
+                </a:solidFill>
+                <a:latin typeface="Arial"/>
+                <a:ea typeface="Arial"/>
+                <a:cs typeface="Arial"/>
+                <a:sym typeface="Arial"/>
+                <a:rtl val="0"/>
+              </a:rPr>
+              <a:t>GRNsight</a:t>
+            </a:r>
+            <a:r>
+              <a:rPr lang="en-US" sz="2200" b="0" i="0" u="none" strike="noStrike" cap="none" baseline="0" dirty="0" smtClean="0">
+                <a:solidFill>
+                  <a:schemeClr val="dk1"/>
+                </a:solidFill>
+                <a:latin typeface="Arial"/>
+                <a:ea typeface="Arial"/>
+                <a:cs typeface="Arial"/>
+                <a:sym typeface="Arial"/>
+                <a:rtl val="0"/>
+              </a:rPr>
+              <a:t> </a:t>
+            </a:r>
+            <a:r>
+              <a:rPr lang="en-US" sz="2200" b="0" i="0" u="none" strike="noStrike" cap="none" baseline="0" dirty="0">
+                <a:solidFill>
+                  <a:schemeClr val="dk1"/>
+                </a:solidFill>
+                <a:latin typeface="Arial"/>
+                <a:ea typeface="Arial"/>
+                <a:cs typeface="Arial"/>
+                <a:sym typeface="Arial"/>
+                <a:rtl val="0"/>
+              </a:rPr>
+              <a:t>code is available under the open source BSD license.</a:t>
             </a:r>
           </a:p>
         </p:txBody>
@@ -26685,7 +26658,7 @@
           <p:nvPr/>
         </p:nvPicPr>
         <p:blipFill>
-          <a:blip r:embed="rId12">
+          <a:blip r:embed="rId9">
             <a:alphaModFix/>
           </a:blip>
           <a:stretch>
@@ -27322,7 +27295,7 @@
           <p:nvPr/>
         </p:nvPicPr>
         <p:blipFill rotWithShape="1">
-          <a:blip r:embed="rId13">
+          <a:blip r:embed="rId10">
             <a:alphaModFix/>
           </a:blip>
           <a:srcRect t="4724"/>
@@ -27349,7 +27322,7 @@
           <p:nvPr/>
         </p:nvPicPr>
         <p:blipFill rotWithShape="1">
-          <a:blip r:embed="rId14">
+          <a:blip r:embed="rId11">
             <a:alphaModFix/>
           </a:blip>
           <a:srcRect/>
@@ -27537,29 +27510,6 @@
       </p:sp>
       <p:pic>
         <p:nvPicPr>
-          <p:cNvPr id="4" name="Picture 3"/>
-          <p:cNvPicPr>
-            <a:picLocks noChangeAspect="1"/>
-          </p:cNvPicPr>
-          <p:nvPr/>
-        </p:nvPicPr>
-        <p:blipFill rotWithShape="1">
-          <a:blip r:embed="rId15"/>
-          <a:srcRect t="2820" b="8677"/>
-          <a:stretch/>
-        </p:blipFill>
-        <p:spPr>
-          <a:xfrm>
-            <a:off x="11889093" y="8217635"/>
-            <a:ext cx="3455514" cy="1911406"/>
-          </a:xfrm>
-          <a:prstGeom prst="rect">
-            <a:avLst/>
-          </a:prstGeom>
-        </p:spPr>
-      </p:pic>
-      <p:pic>
-        <p:nvPicPr>
           <p:cNvPr id="6" name="Picture 5"/>
           <p:cNvPicPr>
             <a:picLocks noChangeAspect="1"/>
@@ -27567,7 +27517,7 @@
           <p:nvPr/>
         </p:nvPicPr>
         <p:blipFill rotWithShape="1">
-          <a:blip r:embed="rId16"/>
+          <a:blip r:embed="rId12"/>
           <a:srcRect l="19671" t="8977" r="944" b="10451"/>
           <a:stretch/>
         </p:blipFill>
@@ -27588,7 +27538,7 @@
           <p:nvPr/>
         </p:nvPicPr>
         <p:blipFill rotWithShape="1">
-          <a:blip r:embed="rId6">
+          <a:blip r:embed="rId4">
             <a:alphaModFix/>
           </a:blip>
           <a:srcRect/>
@@ -27617,7 +27567,7 @@
           <p:nvPr/>
         </p:nvPicPr>
         <p:blipFill>
-          <a:blip r:embed="rId17"/>
+          <a:blip r:embed="rId13"/>
           <a:stretch>
             <a:fillRect/>
           </a:stretch>
@@ -27635,9 +27585,7 @@
       <p:cxnSp>
         <p:nvCxnSpPr>
           <p:cNvPr id="9" name="Straight Arrow Connector 8"/>
-          <p:cNvCxnSpPr>
-            <a:stCxn id="4" idx="3"/>
-          </p:cNvCxnSpPr>
+          <p:cNvCxnSpPr/>
           <p:nvPr/>
         </p:nvCxnSpPr>
         <p:spPr>
@@ -27869,7 +27817,7 @@
         </p:nvSpPr>
         <p:spPr>
           <a:xfrm>
-            <a:off x="20242099" y="14020127"/>
+            <a:off x="20242099" y="13994054"/>
             <a:ext cx="4388061" cy="430887"/>
           </a:xfrm>
           <a:prstGeom prst="rect">
@@ -28079,7 +28027,7 @@
         <p:spPr>
           <a:xfrm>
             <a:off x="11589048" y="14535829"/>
-            <a:ext cx="4585456" cy="3816429"/>
+            <a:ext cx="4585456" cy="4154983"/>
           </a:xfrm>
           <a:prstGeom prst="rect">
             <a:avLst/>
@@ -28099,19 +28047,90 @@
             </a:pPr>
             <a:r>
               <a:rPr lang="en-US" sz="2200" b="1" dirty="0" smtClean="0"/>
-              <a:t>2. Users </a:t>
+              <a:t>2. </a:t>
             </a:r>
             <a:r>
               <a:rPr lang="en-US" sz="2200" b="1" dirty="0"/>
-              <a:t>can utilize force graph parameter sliders to refine the automatic </a:t>
-            </a:r>
-            <a:r>
-              <a:rPr lang="en-US" sz="2200" b="1" dirty="0" smtClean="0">
+              <a:t>F</a:t>
+            </a:r>
+            <a:r>
+              <a:rPr lang="en-US" sz="2200" b="1" dirty="0" smtClean="0"/>
+              <a:t>orce </a:t>
+            </a:r>
+            <a:r>
+              <a:rPr lang="en-US" sz="2200" b="1" dirty="0"/>
+              <a:t>G</a:t>
+            </a:r>
+            <a:r>
+              <a:rPr lang="en-US" sz="2200" b="1" dirty="0" smtClean="0"/>
+              <a:t>raph </a:t>
+            </a:r>
+            <a:r>
+              <a:rPr lang="en-US" sz="2200" b="1" dirty="0" smtClean="0"/>
+              <a:t>P</a:t>
+            </a:r>
+            <a:r>
+              <a:rPr lang="en-US" sz="2200" b="1" dirty="0" smtClean="0"/>
+              <a:t>arameter  </a:t>
+            </a:r>
+          </a:p>
+          <a:p>
+            <a:pPr lvl="0">
+              <a:buClr>
+                <a:schemeClr val="dk1"/>
+              </a:buClr>
+              <a:buSzPct val="100000"/>
+            </a:pPr>
+            <a:r>
+              <a:rPr lang="en-US" sz="2200" b="1" dirty="0"/>
+              <a:t> </a:t>
+            </a:r>
+            <a:r>
+              <a:rPr lang="en-US" sz="2200" b="1" dirty="0" smtClean="0"/>
+              <a:t>   </a:t>
+            </a:r>
+            <a:r>
+              <a:rPr lang="en-US" sz="2200" b="1" dirty="0" smtClean="0"/>
+              <a:t>Sliders </a:t>
+            </a:r>
+            <a:endParaRPr lang="en-US" sz="2200" b="1" dirty="0" smtClean="0">
+              <a:solidFill>
+                <a:schemeClr val="dk1"/>
+              </a:solidFill>
+            </a:endParaRPr>
+          </a:p>
+          <a:p>
+            <a:pPr marL="342900" lvl="0" indent="-342900">
+              <a:buClr>
+                <a:schemeClr val="dk1"/>
+              </a:buClr>
+              <a:buSzPct val="100000"/>
+              <a:buFont typeface="Arial"/>
+              <a:buChar char="•"/>
+            </a:pPr>
+            <a:r>
+              <a:rPr lang="en-US" sz="2200" dirty="0" smtClean="0">
                 <a:solidFill>
                   <a:schemeClr val="dk1"/>
                 </a:solidFill>
               </a:rPr>
-              <a:t>layout.</a:t>
+              <a:t>The </a:t>
+            </a:r>
+            <a:r>
+              <a:rPr lang="en-US" sz="2200" dirty="0">
+                <a:solidFill>
+                  <a:schemeClr val="dk1"/>
+                </a:solidFill>
+              </a:rPr>
+              <a:t>link distance determines the minimum distance maintained between </a:t>
+            </a:r>
+            <a:r>
+              <a:rPr lang="en-US" sz="2200" dirty="0" smtClean="0">
+                <a:solidFill>
+                  <a:schemeClr val="dk1"/>
+                </a:solidFill>
+              </a:rPr>
+              <a:t>nodes.</a:t>
             </a:r>
           </a:p>
           <a:p>
@@ -28129,6 +28148,40 @@
                   <a:schemeClr val="dk1"/>
                 </a:solidFill>
               </a:rPr>
+              <a:t>Nodes </a:t>
+            </a:r>
+            <a:r>
+              <a:rPr lang="en-US" sz="2200" dirty="0">
+                <a:solidFill>
+                  <a:schemeClr val="dk1"/>
+                </a:solidFill>
+              </a:rPr>
+              <a:t>have a charge, which repels or attracts other </a:t>
+            </a:r>
+            <a:r>
+              <a:rPr lang="en-US" sz="2200" dirty="0" smtClean="0">
+                <a:solidFill>
+                  <a:schemeClr val="dk1"/>
+                </a:solidFill>
+              </a:rPr>
+              <a:t>nodes.</a:t>
+            </a:r>
+          </a:p>
+          <a:p>
+            <a:pPr marL="342900" lvl="0" indent="-342900">
+              <a:buClr>
+                <a:schemeClr val="dk1"/>
+              </a:buClr>
+              <a:buSzPct val="100000"/>
+              <a:buFont typeface="Arial"/>
+              <a:buChar char="•"/>
+            </a:pPr>
+            <a:r>
+              <a:rPr lang="en-US" sz="2200" dirty="0" smtClean="0">
+                <a:solidFill>
+                  <a:schemeClr val="dk1"/>
+                </a:solidFill>
+              </a:rPr>
               <a:t>The </a:t>
             </a:r>
             <a:r>
@@ -28137,7 +28190,7 @@
                   <a:schemeClr val="dk1"/>
                 </a:solidFill>
               </a:rPr>
-              <a:t>link distance determines the minimum distance maintained between </a:t>
+              <a:t>charge distance determines </a:t>
             </a:r>
             <a:r>
               <a:rPr lang="en-US" sz="2200" dirty="0" smtClean="0">
@@ -28145,7 +28198,23 @@
                   <a:schemeClr val="dk1"/>
                 </a:solidFill>
               </a:rPr>
-              <a:t>nodes.</a:t>
+              <a:t>at what range </a:t>
+            </a:r>
+            <a:r>
+              <a:rPr lang="en-US" sz="2200" dirty="0">
+                <a:solidFill>
+                  <a:schemeClr val="dk1"/>
+                </a:solidFill>
+              </a:rPr>
+              <a:t>a node’s charge will affect other nodes</a:t>
+            </a:r>
+            <a:r>
+              <a:rPr lang="en-US" sz="2200" dirty="0" smtClean="0">
+                <a:solidFill>
+                  <a:schemeClr val="dk1"/>
+                </a:solidFill>
+              </a:rPr>
+              <a:t>.</a:t>
             </a:r>
           </a:p>
           <a:p>
@@ -28163,73 +28232,7 @@
                   <a:schemeClr val="dk1"/>
                 </a:solidFill>
               </a:rPr>
-              <a:t>Nodes </a:t>
-            </a:r>
-            <a:r>
-              <a:rPr lang="en-US" sz="2200" dirty="0">
-                <a:solidFill>
-                  <a:schemeClr val="dk1"/>
-                </a:solidFill>
-              </a:rPr>
-              <a:t>have a charge, which repels or attracts other </a:t>
-            </a:r>
-            <a:r>
-              <a:rPr lang="en-US" sz="2200" dirty="0" smtClean="0">
-                <a:solidFill>
-                  <a:schemeClr val="dk1"/>
-                </a:solidFill>
-              </a:rPr>
-              <a:t>nodes.</a:t>
-            </a:r>
-          </a:p>
-          <a:p>
-            <a:pPr marL="342900" lvl="0" indent="-342900">
-              <a:buClr>
-                <a:schemeClr val="dk1"/>
-              </a:buClr>
-              <a:buSzPct val="100000"/>
-              <a:buFont typeface="Arial"/>
-              <a:buChar char="•"/>
-            </a:pPr>
-            <a:r>
-              <a:rPr lang="en-US" sz="2200" dirty="0" smtClean="0">
-                <a:solidFill>
-                  <a:schemeClr val="dk1"/>
-                </a:solidFill>
-              </a:rPr>
-              <a:t>The </a:t>
-            </a:r>
-            <a:r>
-              <a:rPr lang="en-US" sz="2200" dirty="0">
-                <a:solidFill>
-                  <a:schemeClr val="dk1"/>
-                </a:solidFill>
-              </a:rPr>
-              <a:t>charge distance determines </a:t>
-            </a:r>
-            <a:r>
-              <a:rPr lang="en-US" sz="2200" dirty="0" smtClean="0">
-                <a:solidFill>
-                  <a:schemeClr val="dk1"/>
-                </a:solidFill>
-              </a:rPr>
-              <a:t>at what range </a:t>
-            </a:r>
-            <a:r>
-              <a:rPr lang="en-US" sz="2200" dirty="0">
-                <a:solidFill>
-                  <a:schemeClr val="dk1"/>
-                </a:solidFill>
-              </a:rPr>
-              <a:t>a node’s charge will affect other nodes</a:t>
-            </a:r>
-            <a:r>
-              <a:rPr lang="en-US" sz="2200" dirty="0" smtClean="0">
-                <a:solidFill>
-                  <a:schemeClr val="dk1"/>
-                </a:solidFill>
-              </a:rPr>
-              <a:t>.</a:t>
+              <a:t>The force graph parameters can be locked or reset.</a:t>
             </a:r>
             <a:endParaRPr lang="en-US" sz="2200" dirty="0">
               <a:solidFill>
@@ -28248,7 +28251,7 @@
         <p:spPr>
           <a:xfrm>
             <a:off x="11515923" y="10363853"/>
-            <a:ext cx="4623304" cy="4832092"/>
+            <a:ext cx="4623304" cy="4493537"/>
           </a:xfrm>
           <a:prstGeom prst="rect">
             <a:avLst/>
@@ -28268,12 +28271,13 @@
             </a:pPr>
             <a:r>
               <a:rPr lang="en-US" sz="2200" b="1" dirty="0" smtClean="0"/>
-              <a:t>1. A </a:t>
-            </a:r>
-            <a:r>
-              <a:rPr lang="en-US" sz="2200" b="1" dirty="0"/>
-              <a:t>Menu Bar was Introduced </a:t>
-            </a:r>
+              <a:t>1. </a:t>
+            </a:r>
+            <a:r>
+              <a:rPr lang="en-US" sz="2200" b="1" dirty="0" smtClean="0"/>
+              <a:t>Menu Bar</a:t>
+            </a:r>
+            <a:endParaRPr lang="en-US" sz="2200" b="1" dirty="0"/>
           </a:p>
           <a:p>
             <a:pPr marL="342900" lvl="0" indent="-342900">
@@ -28290,7 +28294,15 @@
             </a:r>
             <a:r>
               <a:rPr lang="en-US" sz="2200" dirty="0"/>
-              <a:t>demo files were added to the “</a:t>
+              <a:t>demo files </a:t>
+            </a:r>
+            <a:r>
+              <a:rPr lang="en-US" sz="2200" dirty="0" smtClean="0"/>
+              <a:t>are contained in </a:t>
+            </a:r>
+            <a:r>
+              <a:rPr lang="en-US" sz="2200" dirty="0"/>
+              <a:t>the “</a:t>
             </a:r>
             <a:r>
               <a:rPr lang="en-US" sz="2200" dirty="0" smtClean="0"/>
@@ -28309,7 +28321,15 @@
             </a:pPr>
             <a:r>
               <a:rPr lang="en-US" sz="2200" dirty="0"/>
-              <a:t>Print functionality was enabled in the “File” menu option</a:t>
+              <a:t>Print functionality </a:t>
+            </a:r>
+            <a:r>
+              <a:rPr lang="en-US" sz="2200" dirty="0" smtClean="0"/>
+              <a:t>is enabled </a:t>
+            </a:r>
+            <a:r>
+              <a:rPr lang="en-US" sz="2200" dirty="0"/>
+              <a:t>in the “File” menu option</a:t>
             </a:r>
             <a:r>
               <a:rPr lang="en-US" sz="2200" dirty="0" smtClean="0"/>
@@ -28421,18 +28441,16 @@
                   <a:schemeClr val="dk1"/>
                 </a:solidFill>
               </a:rPr>
-              <a:t> graphs.</a:t>
-            </a:r>
-          </a:p>
-          <a:p>
-            <a:pPr marL="342900" indent="-342900">
-              <a:buClr>
-                <a:srgbClr val="000000"/>
-              </a:buClr>
-              <a:buSzPct val="100000"/>
-              <a:buFont typeface="Arial"/>
-              <a:buChar char="•"/>
-            </a:pPr>
+              <a:t> graphs</a:t>
+            </a:r>
+            <a:r>
+              <a:rPr lang="en-US" sz="2200" dirty="0" smtClean="0">
+                <a:solidFill>
+                  <a:schemeClr val="dk1"/>
+                </a:solidFill>
+              </a:rPr>
+              <a:t>.</a:t>
+            </a:r>
             <a:endParaRPr lang="en-US" sz="2200" dirty="0">
               <a:solidFill>
                 <a:schemeClr val="dk1"/>
@@ -28460,8 +28478,8 @@
         </p:nvSpPr>
         <p:spPr>
           <a:xfrm>
-            <a:off x="16277164" y="14451014"/>
-            <a:ext cx="12045548" cy="4157107"/>
+            <a:off x="16277164" y="14338300"/>
+            <a:ext cx="12045548" cy="4365362"/>
           </a:xfrm>
           <a:prstGeom prst="rect">
             <a:avLst/>
@@ -28601,24 +28619,44 @@
             </a:endParaRPr>
           </a:p>
           <a:p>
-            <a:pPr marL="0" marR="0" lvl="0" indent="0" algn="l" rtl="0">
-              <a:lnSpc>
-                <a:spcPct val="100000"/>
-              </a:lnSpc>
-              <a:spcBef>
-                <a:spcPts val="0"/>
-              </a:spcBef>
-              <a:spcAft>
-                <a:spcPts val="0"/>
-              </a:spcAft>
-              <a:buClr>
-                <a:srgbClr val="FF0000"/>
-              </a:buClr>
-              <a:buSzPct val="25000"/>
-              <a:buFont typeface="Arial"/>
-              <a:buNone/>
-            </a:pPr>
-            <a:endParaRPr lang="en-US" sz="2200" b="1" i="0" u="none" strike="noStrike" cap="none" baseline="0" dirty="0">
+            <a:pPr marR="0" lvl="0" algn="l" rtl="0">
+              <a:lnSpc>
+                <a:spcPct val="100000"/>
+              </a:lnSpc>
+              <a:spcBef>
+                <a:spcPts val="0"/>
+              </a:spcBef>
+              <a:spcAft>
+                <a:spcPts val="0"/>
+              </a:spcAft>
+              <a:buClr>
+                <a:schemeClr val="dk1"/>
+              </a:buClr>
+              <a:buSzPct val="100000"/>
+            </a:pPr>
+            <a:endParaRPr lang="en-US" sz="2200" b="1" dirty="0">
+              <a:solidFill>
+                <a:schemeClr val="dk1"/>
+              </a:solidFill>
+            </a:endParaRPr>
+          </a:p>
+          <a:p>
+            <a:pPr marR="0" lvl="0" algn="l" rtl="0">
+              <a:lnSpc>
+                <a:spcPct val="100000"/>
+              </a:lnSpc>
+              <a:spcBef>
+                <a:spcPts val="0"/>
+              </a:spcBef>
+              <a:spcAft>
+                <a:spcPts val="0"/>
+              </a:spcAft>
+              <a:buClr>
+                <a:schemeClr val="dk1"/>
+              </a:buClr>
+              <a:buSzPct val="100000"/>
+            </a:pPr>
+            <a:endParaRPr lang="en-US" sz="1000" b="0" i="0" u="none" strike="noStrike" cap="none" baseline="0" dirty="0" smtClean="0">
               <a:solidFill>
                 <a:schemeClr val="dk1"/>
               </a:solidFill>
@@ -28648,7 +28686,7 @@
               <a:buChar char="•"/>
             </a:pPr>
             <a:r>
-              <a:rPr lang="en-US" sz="2200" b="0" i="0" u="none" strike="noStrike" cap="none" baseline="0" dirty="0">
+              <a:rPr lang="en-US" sz="2200" b="0" i="0" u="none" strike="noStrike" cap="none" baseline="0" dirty="0" smtClean="0">
                 <a:solidFill>
                   <a:schemeClr val="dk1"/>
                 </a:solidFill>
@@ -28658,12 +28696,12 @@
                 <a:sym typeface="Arial"/>
                 <a:rtl val="0"/>
               </a:rPr>
-              <a:t>Edge thickness was changed to be based on a linear scale instead of four quartiles.</a:t>
+              <a:t>Edge </a:t>
             </a:r>
             <a:r>
               <a:rPr lang="en-US" sz="2200" b="0" i="0" u="none" strike="noStrike" cap="none" baseline="0" dirty="0">
                 <a:solidFill>
-                  <a:srgbClr val="000000"/>
+                  <a:schemeClr val="dk1"/>
                 </a:solidFill>
                 <a:latin typeface="Arial"/>
                 <a:ea typeface="Arial"/>
@@ -28671,31 +28709,12 @@
                 <a:sym typeface="Arial"/>
                 <a:rtl val="0"/>
               </a:rPr>
-              <a:t> </a:t>
-            </a:r>
-          </a:p>
-          <a:p>
-            <a:pPr marL="968375" marR="0" lvl="1" indent="-523875" algn="l" rtl="0">
-              <a:lnSpc>
-                <a:spcPct val="100000"/>
-              </a:lnSpc>
-              <a:spcBef>
-                <a:spcPts val="0"/>
-              </a:spcBef>
-              <a:spcAft>
-                <a:spcPts val="0"/>
-              </a:spcAft>
-              <a:buClr>
-                <a:schemeClr val="dk1"/>
-              </a:buClr>
-              <a:buSzPct val="100000"/>
-              <a:buFont typeface="Arial"/>
-              <a:buChar char="•"/>
-            </a:pPr>
-            <a:r>
-              <a:rPr lang="en-US" sz="2200" b="0" i="0" u="none" strike="noStrike" cap="none" baseline="0" dirty="0">
-                <a:solidFill>
-                  <a:srgbClr val="000000"/>
+              <a:t>thickness </a:t>
+            </a:r>
+            <a:r>
+              <a:rPr lang="en-US" sz="2200" b="0" i="0" u="none" strike="noStrike" cap="none" baseline="0" dirty="0" smtClean="0">
+                <a:solidFill>
+                  <a:schemeClr val="dk1"/>
                 </a:solidFill>
                 <a:latin typeface="Arial"/>
                 <a:ea typeface="Arial"/>
@@ -28703,27 +28722,8 @@
                 <a:sym typeface="Arial"/>
                 <a:rtl val="0"/>
               </a:rPr>
-              <a:t>The weight values are normalized to between 0 and 1, then the thicknesses of the lines are adjusted to vary continuously from the minimum thickness (for normalized weights near zero) to the maximum thickness (weights of 1). </a:t>
-            </a:r>
-          </a:p>
-          <a:p>
-            <a:pPr marL="342900" marR="0" lvl="0" indent="-342900" algn="l" rtl="0">
-              <a:lnSpc>
-                <a:spcPct val="100000"/>
-              </a:lnSpc>
-              <a:spcBef>
-                <a:spcPts val="0"/>
-              </a:spcBef>
-              <a:spcAft>
-                <a:spcPts val="0"/>
-              </a:spcAft>
-              <a:buClr>
-                <a:schemeClr val="dk1"/>
-              </a:buClr>
-              <a:buSzPct val="100000"/>
-              <a:buFont typeface="Arial"/>
-              <a:buChar char="•"/>
-            </a:pPr>
+              <a:t>is based </a:t>
+            </a:r>
             <a:r>
               <a:rPr lang="en-US" sz="2200" b="0" i="0" u="none" strike="noStrike" cap="none" baseline="0" dirty="0">
                 <a:solidFill>
@@ -28735,7 +28735,7 @@
                 <a:sym typeface="Arial"/>
                 <a:rtl val="0"/>
               </a:rPr>
-              <a:t>Edges were changed to curves with control points to prevent </a:t>
+              <a:t>on a linear </a:t>
             </a:r>
             <a:r>
               <a:rPr lang="en-US" sz="2200" b="0" i="0" u="none" strike="noStrike" cap="none" baseline="0" dirty="0" smtClean="0">
@@ -28748,12 +28748,12 @@
                 <a:sym typeface="Arial"/>
                 <a:rtl val="0"/>
               </a:rPr>
-              <a:t>curves </a:t>
-            </a:r>
-            <a:r>
-              <a:rPr lang="en-US" sz="2200" b="0" i="0" u="none" strike="noStrike" cap="none" baseline="0" dirty="0">
-                <a:solidFill>
-                  <a:schemeClr val="dk1"/>
+              <a:t>scale.</a:t>
+            </a:r>
+            <a:r>
+              <a:rPr lang="en-US" sz="2200" b="0" i="0" u="none" strike="noStrike" cap="none" baseline="0" dirty="0" smtClean="0">
+                <a:solidFill>
+                  <a:srgbClr val="000000"/>
                 </a:solidFill>
                 <a:latin typeface="Arial"/>
                 <a:ea typeface="Arial"/>
@@ -28761,50 +28761,11 @@
                 <a:sym typeface="Arial"/>
                 <a:rtl val="0"/>
               </a:rPr>
-              <a:t>from </a:t>
-            </a:r>
-            <a:r>
-              <a:rPr lang="en-US" sz="2200" b="0" i="0" u="none" strike="noStrike" cap="none" baseline="0" dirty="0" smtClean="0">
-                <a:solidFill>
-                  <a:schemeClr val="dk1"/>
-                </a:solidFill>
-                <a:latin typeface="Arial"/>
-                <a:ea typeface="Arial"/>
-                <a:cs typeface="Arial"/>
-                <a:sym typeface="Arial"/>
-                <a:rtl val="0"/>
-              </a:rPr>
-              <a:t>leaving the </a:t>
-            </a:r>
-            <a:r>
-              <a:rPr lang="en-US" sz="2200" b="0" i="0" u="none" strike="noStrike" cap="none" baseline="0" dirty="0">
-                <a:solidFill>
-                  <a:schemeClr val="dk1"/>
-                </a:solidFill>
-                <a:latin typeface="Arial"/>
-                <a:ea typeface="Arial"/>
-                <a:cs typeface="Arial"/>
-                <a:sym typeface="Arial"/>
-                <a:rtl val="0"/>
-              </a:rPr>
-              <a:t>bounding box</a:t>
-            </a:r>
-            <a:r>
-              <a:rPr lang="en-US" sz="2200" b="0" i="0" u="none" strike="noStrike" cap="none" baseline="0" dirty="0" smtClean="0">
-                <a:solidFill>
-                  <a:schemeClr val="dk1"/>
-                </a:solidFill>
-                <a:latin typeface="Arial"/>
-                <a:ea typeface="Arial"/>
-                <a:cs typeface="Arial"/>
-                <a:sym typeface="Arial"/>
-                <a:rtl val="0"/>
-              </a:rPr>
-              <a:t>.</a:t>
-            </a:r>
-            <a:endParaRPr sz="2200" b="0" i="0" u="none" strike="noStrike" cap="none" baseline="0" dirty="0">
+              <a:t> </a:t>
+            </a:r>
+            <a:endParaRPr lang="en-US" sz="2200" b="0" i="0" u="none" strike="noStrike" cap="none" baseline="0" dirty="0">
               <a:solidFill>
-                <a:schemeClr val="dk1"/>
+                <a:srgbClr val="000000"/>
               </a:solidFill>
               <a:latin typeface="Arial"/>
               <a:ea typeface="Arial"/>
@@ -28814,7 +28775,16 @@
             </a:endParaRPr>
           </a:p>
           <a:p>
-            <a:pPr marL="342900" indent="-342900">
+            <a:pPr marL="968375" marR="0" lvl="1" indent="-523875" algn="l" rtl="0">
+              <a:lnSpc>
+                <a:spcPct val="100000"/>
+              </a:lnSpc>
+              <a:spcBef>
+                <a:spcPts val="0"/>
+              </a:spcBef>
+              <a:spcAft>
+                <a:spcPts val="0"/>
+              </a:spcAft>
               <a:buClr>
                 <a:schemeClr val="dk1"/>
               </a:buClr>
@@ -28823,12 +28793,86 @@
               <a:buChar char="•"/>
             </a:pPr>
             <a:r>
+              <a:rPr lang="en-US" sz="2200" b="0" i="0" u="none" strike="noStrike" cap="none" baseline="0" dirty="0">
+                <a:solidFill>
+                  <a:srgbClr val="000000"/>
+                </a:solidFill>
+                <a:latin typeface="Arial"/>
+                <a:ea typeface="Arial"/>
+                <a:cs typeface="Arial"/>
+                <a:sym typeface="Arial"/>
+                <a:rtl val="0"/>
+              </a:rPr>
+              <a:t>The weight values are normalized to between 0 and 1, then the thicknesses of the lines are adjusted to vary continuously from the minimum thickness </a:t>
+            </a:r>
+            <a:r>
+              <a:rPr lang="en-US" sz="2200" b="0" i="0" u="none" strike="noStrike" cap="none" baseline="0" dirty="0" smtClean="0">
+                <a:solidFill>
+                  <a:srgbClr val="000000"/>
+                </a:solidFill>
+                <a:latin typeface="Arial"/>
+                <a:ea typeface="Arial"/>
+                <a:cs typeface="Arial"/>
+                <a:sym typeface="Arial"/>
+                <a:rtl val="0"/>
+              </a:rPr>
+              <a:t>(normalized</a:t>
+            </a:r>
+            <a:r>
+              <a:rPr lang="en-US" sz="2200" b="0" i="0" u="none" strike="noStrike" cap="none" dirty="0" smtClean="0">
+                <a:solidFill>
+                  <a:srgbClr val="000000"/>
+                </a:solidFill>
+                <a:latin typeface="Arial"/>
+                <a:ea typeface="Arial"/>
+                <a:cs typeface="Arial"/>
+                <a:sym typeface="Arial"/>
+                <a:rtl val="0"/>
+              </a:rPr>
+              <a:t> </a:t>
+            </a:r>
+            <a:r>
+              <a:rPr lang="en-US" sz="2200" b="0" i="0" u="none" strike="noStrike" cap="none" baseline="0" dirty="0" smtClean="0">
+                <a:solidFill>
+                  <a:srgbClr val="000000"/>
+                </a:solidFill>
+                <a:latin typeface="Arial"/>
+                <a:ea typeface="Arial"/>
+                <a:cs typeface="Arial"/>
+                <a:sym typeface="Arial"/>
+                <a:rtl val="0"/>
+              </a:rPr>
+              <a:t>weights </a:t>
+            </a:r>
+            <a:r>
+              <a:rPr lang="en-US" sz="2200" b="0" i="0" u="none" strike="noStrike" cap="none" baseline="0" dirty="0">
+                <a:solidFill>
+                  <a:srgbClr val="000000"/>
+                </a:solidFill>
+                <a:latin typeface="Arial"/>
+                <a:ea typeface="Arial"/>
+                <a:cs typeface="Arial"/>
+                <a:sym typeface="Arial"/>
+                <a:rtl val="0"/>
+              </a:rPr>
+              <a:t>near zero) to the maximum thickness (weights of 1). </a:t>
+            </a:r>
+          </a:p>
+          <a:p>
+            <a:pPr marL="342900" lvl="0" indent="-342900">
+              <a:buClr>
+                <a:srgbClr val="000000"/>
+              </a:buClr>
+              <a:buFont typeface="Arial"/>
+              <a:buChar char="•"/>
+            </a:pPr>
+            <a:r>
               <a:rPr lang="en-US" sz="2200" dirty="0" smtClean="0">
                 <a:solidFill>
                   <a:schemeClr val="dk1"/>
                 </a:solidFill>
               </a:rPr>
-              <a:t>A </a:t>
+              <a:t>Edges </a:t>
             </a:r>
             <a:r>
               <a:rPr lang="en-US" sz="2200" dirty="0">
@@ -28836,7 +28880,7 @@
                   <a:schemeClr val="dk1"/>
                 </a:solidFill>
               </a:rPr>
-              <a:t>special case was added to add a looping edge if a node regulated itself</a:t>
+              <a:t>with </a:t>
             </a:r>
             <a:r>
               <a:rPr lang="en-US" sz="2200" dirty="0" smtClean="0">
@@ -28844,37 +28888,41 @@
                   <a:schemeClr val="dk1"/>
                 </a:solidFill>
               </a:rPr>
-              <a:t>.</a:t>
-            </a:r>
-            <a:endParaRPr sz="2200" b="0" i="0" u="none" strike="noStrike" cap="none" baseline="0" dirty="0">
-              <a:solidFill>
-                <a:schemeClr val="dk1"/>
-              </a:solidFill>
-              <a:latin typeface="Arial"/>
-              <a:ea typeface="Arial"/>
-              <a:cs typeface="Arial"/>
-              <a:sym typeface="Arial"/>
-              <a:rtl val="0"/>
-            </a:endParaRPr>
-          </a:p>
-          <a:p>
-            <a:pPr marL="0" marR="0" lvl="0" indent="0" algn="l" rtl="0">
-              <a:lnSpc>
-                <a:spcPct val="100000"/>
-              </a:lnSpc>
-              <a:spcBef>
-                <a:spcPts val="0"/>
-              </a:spcBef>
-              <a:spcAft>
-                <a:spcPts val="0"/>
-              </a:spcAft>
-              <a:buClr>
-                <a:srgbClr val="000000"/>
-              </a:buClr>
-              <a:buFont typeface="Arial"/>
-              <a:buNone/>
-            </a:pPr>
-            <a:endParaRPr sz="2200" b="1" i="0" u="none" strike="noStrike" cap="none" baseline="0" dirty="0">
+              <a:t>normalized </a:t>
+            </a:r>
+            <a:r>
+              <a:rPr lang="en-US" sz="2200" dirty="0">
+                <a:solidFill>
+                  <a:schemeClr val="dk1"/>
+                </a:solidFill>
+              </a:rPr>
+              <a:t>weight values from 0.05 to 1 are colored magenta; edges with </a:t>
+            </a:r>
+            <a:r>
+              <a:rPr lang="en-US" sz="2200" dirty="0" smtClean="0">
+                <a:solidFill>
+                  <a:schemeClr val="dk1"/>
+                </a:solidFill>
+              </a:rPr>
+              <a:t>normalized </a:t>
+            </a:r>
+            <a:r>
+              <a:rPr lang="en-US" sz="2200" dirty="0">
+                <a:solidFill>
+                  <a:schemeClr val="dk1"/>
+                </a:solidFill>
+              </a:rPr>
+              <a:t>weight values from -0.05 to -1 are colored cyan. Edges with normalized weight values between -0.05 and 0.05 are </a:t>
+            </a:r>
+            <a:r>
+              <a:rPr lang="en-US" sz="2200" dirty="0" smtClean="0">
+                <a:solidFill>
+                  <a:schemeClr val="dk1"/>
+                </a:solidFill>
+              </a:rPr>
+              <a:t>colored grey.</a:t>
+            </a:r>
+            <a:endParaRPr sz="2200" i="0" u="none" strike="noStrike" cap="none" baseline="0" dirty="0">
               <a:solidFill>
                 <a:schemeClr val="dk1"/>
               </a:solidFill>
@@ -28894,7 +28942,7 @@
           <p:nvPr/>
         </p:nvPicPr>
         <p:blipFill rotWithShape="1">
-          <a:blip r:embed="rId18">
+          <a:blip r:embed="rId14">
             <a:alphaModFix/>
           </a:blip>
           <a:srcRect l="51219" t="35156" b="33193"/>
@@ -28921,7 +28969,7 @@
           <p:nvPr/>
         </p:nvPicPr>
         <p:blipFill rotWithShape="1">
-          <a:blip r:embed="rId18">
+          <a:blip r:embed="rId14">
             <a:alphaModFix/>
           </a:blip>
           <a:srcRect t="68506" r="36449"/>
@@ -28943,12 +28991,39 @@
       </p:pic>
       <p:pic>
         <p:nvPicPr>
+          <p:cNvPr id="164" name="Shape 123"/>
+          <p:cNvPicPr preferRelativeResize="0"/>
+          <p:nvPr/>
+        </p:nvPicPr>
+        <p:blipFill rotWithShape="1">
+          <a:blip r:embed="rId14">
+            <a:alphaModFix/>
+          </a:blip>
+          <a:srcRect t="35156" r="56613" b="33193"/>
+          <a:stretch/>
+        </p:blipFill>
+        <p:spPr>
+          <a:xfrm>
+            <a:off x="16060542" y="14781755"/>
+            <a:ext cx="2867225" cy="1384145"/>
+          </a:xfrm>
+          <a:prstGeom prst="rect">
+            <a:avLst/>
+          </a:prstGeom>
+          <a:noFill/>
+          <a:ln>
+            <a:noFill/>
+          </a:ln>
+        </p:spPr>
+      </p:pic>
+      <p:pic>
+        <p:nvPicPr>
           <p:cNvPr id="163" name="Shape 123"/>
           <p:cNvPicPr preferRelativeResize="0"/>
           <p:nvPr/>
         </p:nvPicPr>
         <p:blipFill rotWithShape="1">
-          <a:blip r:embed="rId18">
+          <a:blip r:embed="rId14">
             <a:alphaModFix/>
           </a:blip>
           <a:srcRect l="66784" t="68506"/>
@@ -28968,33 +29043,6 @@
           </a:ln>
         </p:spPr>
       </p:pic>
-      <p:pic>
-        <p:nvPicPr>
-          <p:cNvPr id="164" name="Shape 123"/>
-          <p:cNvPicPr preferRelativeResize="0"/>
-          <p:nvPr/>
-        </p:nvPicPr>
-        <p:blipFill rotWithShape="1">
-          <a:blip r:embed="rId18">
-            <a:alphaModFix/>
-          </a:blip>
-          <a:srcRect t="35156" r="56613" b="33193"/>
-          <a:stretch/>
-        </p:blipFill>
-        <p:spPr>
-          <a:xfrm>
-            <a:off x="16060542" y="14781755"/>
-            <a:ext cx="2867225" cy="1384145"/>
-          </a:xfrm>
-          <a:prstGeom prst="rect">
-            <a:avLst/>
-          </a:prstGeom>
-          <a:noFill/>
-          <a:ln>
-            <a:noFill/>
-          </a:ln>
-        </p:spPr>
-      </p:pic>
       <p:sp>
         <p:nvSpPr>
           <p:cNvPr id="2" name="TextBox 1"/>
@@ -29003,8 +29051,8 @@
         </p:nvSpPr>
         <p:spPr>
           <a:xfrm>
-            <a:off x="17754600" y="27937617"/>
-            <a:ext cx="13984937" cy="2800766"/>
+            <a:off x="18047352" y="27937617"/>
+            <a:ext cx="13692185" cy="3139321"/>
           </a:xfrm>
           <a:prstGeom prst="rect">
             <a:avLst/>
@@ -29157,6 +29205,89 @@
           </a:p>
         </p:txBody>
       </p:sp>
+      <p:pic>
+        <p:nvPicPr>
+          <p:cNvPr id="10" name="Picture 9" descr="GRNsight_logo_20140710_main.jpg"/>
+          <p:cNvPicPr>
+            <a:picLocks noChangeAspect="1"/>
+          </p:cNvPicPr>
+          <p:nvPr/>
+        </p:nvPicPr>
+        <p:blipFill>
+          <a:blip r:embed="rId15">
+            <a:extLst>
+              <a:ext uri="{28A0092B-C50C-407E-A947-70E740481C1C}">
+                <a14:useLocalDpi xmlns:a14="http://schemas.microsoft.com/office/drawing/2010/main" val="0"/>
+              </a:ext>
+            </a:extLst>
+          </a:blip>
+          <a:stretch>
+            <a:fillRect/>
+          </a:stretch>
+        </p:blipFill>
+        <p:spPr>
+          <a:xfrm>
+            <a:off x="1563125" y="1629906"/>
+            <a:ext cx="5415186" cy="2324701"/>
+          </a:xfrm>
+          <a:prstGeom prst="rect">
+            <a:avLst/>
+          </a:prstGeom>
+        </p:spPr>
+      </p:pic>
+      <p:pic>
+        <p:nvPicPr>
+          <p:cNvPr id="78" name="Picture 77" descr="Sample_network_worksheet.jpg"/>
+          <p:cNvPicPr>
+            <a:picLocks noChangeAspect="1"/>
+          </p:cNvPicPr>
+          <p:nvPr/>
+        </p:nvPicPr>
+        <p:blipFill>
+          <a:blip r:embed="rId16">
+            <a:extLst>
+              <a:ext uri="{28A0092B-C50C-407E-A947-70E740481C1C}">
+                <a14:useLocalDpi xmlns:a14="http://schemas.microsoft.com/office/drawing/2010/main" val="0"/>
+              </a:ext>
+            </a:extLst>
+          </a:blip>
+          <a:stretch>
+            <a:fillRect/>
+          </a:stretch>
+        </p:blipFill>
+        <p:spPr>
+          <a:xfrm>
+            <a:off x="2155888" y="29494918"/>
+            <a:ext cx="7013512" cy="2448271"/>
+          </a:xfrm>
+          <a:prstGeom prst="rect">
+            <a:avLst/>
+          </a:prstGeom>
+        </p:spPr>
+      </p:pic>
+      <p:pic>
+        <p:nvPicPr>
+          <p:cNvPr id="79" name="Picture 78"/>
+          <p:cNvPicPr>
+            <a:picLocks noChangeAspect="1"/>
+          </p:cNvPicPr>
+          <p:nvPr/>
+        </p:nvPicPr>
+        <p:blipFill rotWithShape="1">
+          <a:blip r:embed="rId17"/>
+          <a:srcRect t="2820" b="8677"/>
+          <a:stretch/>
+        </p:blipFill>
+        <p:spPr>
+          <a:xfrm>
+            <a:off x="11734243" y="8290338"/>
+            <a:ext cx="3455514" cy="1911406"/>
+          </a:xfrm>
+          <a:prstGeom prst="rect">
+            <a:avLst/>
+          </a:prstGeom>
+        </p:spPr>
+      </p:pic>
     </p:spTree>
     <p:extLst>
       <p:ext uri="{BB962C8B-B14F-4D97-AF65-F5344CB8AC3E}">

</xml_diff>